<commit_message>
Week 3 PPT Draft
</commit_message>
<xml_diff>
--- a/Week-3/Using the Linux Servers.pptx
+++ b/Week-3/Using the Linux Servers.pptx
@@ -11,6 +11,10 @@
     <p:sldId id="259" r:id="rId5"/>
     <p:sldId id="260" r:id="rId6"/>
     <p:sldId id="261" r:id="rId7"/>
+    <p:sldId id="262" r:id="rId8"/>
+    <p:sldId id="264" r:id="rId9"/>
+    <p:sldId id="265" r:id="rId10"/>
+    <p:sldId id="263" r:id="rId11"/>
   </p:sldIdLst>
   <p:sldSz cx="12192000" cy="6858000"/>
   <p:notesSz cx="6858000" cy="9144000"/>
@@ -264,7 +268,7 @@
           <a:p>
             <a:fld id="{A838DADD-FAEC-4C43-8F31-16C972EDC559}" type="datetimeFigureOut">
               <a:rPr lang="en-US" smtClean="0"/>
-              <a:t>9/20/2018</a:t>
+              <a:t>10/17/2018</a:t>
             </a:fld>
             <a:endParaRPr lang="en-US"/>
           </a:p>
@@ -462,7 +466,7 @@
           <a:p>
             <a:fld id="{A838DADD-FAEC-4C43-8F31-16C972EDC559}" type="datetimeFigureOut">
               <a:rPr lang="en-US" smtClean="0"/>
-              <a:t>9/20/2018</a:t>
+              <a:t>10/17/2018</a:t>
             </a:fld>
             <a:endParaRPr lang="en-US"/>
           </a:p>
@@ -670,7 +674,7 @@
           <a:p>
             <a:fld id="{A838DADD-FAEC-4C43-8F31-16C972EDC559}" type="datetimeFigureOut">
               <a:rPr lang="en-US" smtClean="0"/>
-              <a:t>9/20/2018</a:t>
+              <a:t>10/17/2018</a:t>
             </a:fld>
             <a:endParaRPr lang="en-US"/>
           </a:p>
@@ -868,7 +872,7 @@
           <a:p>
             <a:fld id="{A838DADD-FAEC-4C43-8F31-16C972EDC559}" type="datetimeFigureOut">
               <a:rPr lang="en-US" smtClean="0"/>
-              <a:t>9/20/2018</a:t>
+              <a:t>10/17/2018</a:t>
             </a:fld>
             <a:endParaRPr lang="en-US"/>
           </a:p>
@@ -1143,7 +1147,7 @@
           <a:p>
             <a:fld id="{A838DADD-FAEC-4C43-8F31-16C972EDC559}" type="datetimeFigureOut">
               <a:rPr lang="en-US" smtClean="0"/>
-              <a:t>9/20/2018</a:t>
+              <a:t>10/17/2018</a:t>
             </a:fld>
             <a:endParaRPr lang="en-US"/>
           </a:p>
@@ -1419,7 +1423,7 @@
           <a:p>
             <a:fld id="{A838DADD-FAEC-4C43-8F31-16C972EDC559}" type="datetimeFigureOut">
               <a:rPr lang="en-US" smtClean="0"/>
-              <a:t>9/20/2018</a:t>
+              <a:t>10/17/2018</a:t>
             </a:fld>
             <a:endParaRPr lang="en-US"/>
           </a:p>
@@ -1831,7 +1835,7 @@
           <a:p>
             <a:fld id="{A838DADD-FAEC-4C43-8F31-16C972EDC559}" type="datetimeFigureOut">
               <a:rPr lang="en-US" smtClean="0"/>
-              <a:t>9/20/2018</a:t>
+              <a:t>10/17/2018</a:t>
             </a:fld>
             <a:endParaRPr lang="en-US"/>
           </a:p>
@@ -1972,7 +1976,7 @@
           <a:p>
             <a:fld id="{A838DADD-FAEC-4C43-8F31-16C972EDC559}" type="datetimeFigureOut">
               <a:rPr lang="en-US" smtClean="0"/>
-              <a:t>9/20/2018</a:t>
+              <a:t>10/17/2018</a:t>
             </a:fld>
             <a:endParaRPr lang="en-US"/>
           </a:p>
@@ -2085,7 +2089,7 @@
           <a:p>
             <a:fld id="{A838DADD-FAEC-4C43-8F31-16C972EDC559}" type="datetimeFigureOut">
               <a:rPr lang="en-US" smtClean="0"/>
-              <a:t>9/20/2018</a:t>
+              <a:t>10/17/2018</a:t>
             </a:fld>
             <a:endParaRPr lang="en-US"/>
           </a:p>
@@ -2396,7 +2400,7 @@
           <a:p>
             <a:fld id="{A838DADD-FAEC-4C43-8F31-16C972EDC559}" type="datetimeFigureOut">
               <a:rPr lang="en-US" smtClean="0"/>
-              <a:t>9/20/2018</a:t>
+              <a:t>10/17/2018</a:t>
             </a:fld>
             <a:endParaRPr lang="en-US"/>
           </a:p>
@@ -2684,7 +2688,7 @@
           <a:p>
             <a:fld id="{A838DADD-FAEC-4C43-8F31-16C972EDC559}" type="datetimeFigureOut">
               <a:rPr lang="en-US" smtClean="0"/>
-              <a:t>9/20/2018</a:t>
+              <a:t>10/17/2018</a:t>
             </a:fld>
             <a:endParaRPr lang="en-US"/>
           </a:p>
@@ -2928,7 +2932,7 @@
           <a:p>
             <a:fld id="{A838DADD-FAEC-4C43-8F31-16C972EDC559}" type="datetimeFigureOut">
               <a:rPr lang="en-US" smtClean="0"/>
-              <a:t>9/20/2018</a:t>
+              <a:t>10/17/2018</a:t>
             </a:fld>
             <a:endParaRPr lang="en-US"/>
           </a:p>
@@ -3426,6 +3430,146 @@
 </p:sld>
 </file>
 
+<file path=ppt/slides/slide10.xml><?xml version="1.0" encoding="utf-8"?>
+<p:sld xmlns:a="http://schemas.openxmlformats.org/drawingml/2006/main" xmlns:r="http://schemas.openxmlformats.org/officeDocument/2006/relationships" xmlns:p="http://schemas.openxmlformats.org/presentationml/2006/main">
+  <p:cSld>
+    <p:spTree>
+      <p:nvGrpSpPr>
+        <p:cNvPr id="1" name=""/>
+        <p:cNvGrpSpPr/>
+        <p:nvPr/>
+      </p:nvGrpSpPr>
+      <p:grpSpPr>
+        <a:xfrm>
+          <a:off x="0" y="0"/>
+          <a:ext cx="0" cy="0"/>
+          <a:chOff x="0" y="0"/>
+          <a:chExt cx="0" cy="0"/>
+        </a:xfrm>
+      </p:grpSpPr>
+      <p:sp>
+        <p:nvSpPr>
+          <p:cNvPr id="2" name="Title 1">
+            <a:extLst>
+              <a:ext uri="{FF2B5EF4-FFF2-40B4-BE49-F238E27FC236}">
+                <a16:creationId xmlns:a16="http://schemas.microsoft.com/office/drawing/2014/main" id="{E23E2CF8-5305-4804-A685-3EBE2824A3AF}"/>
+              </a:ext>
+            </a:extLst>
+          </p:cNvPr>
+          <p:cNvSpPr>
+            <a:spLocks noGrp="1"/>
+          </p:cNvSpPr>
+          <p:nvPr>
+            <p:ph type="title"/>
+          </p:nvPr>
+        </p:nvSpPr>
+        <p:spPr/>
+        <p:txBody>
+          <a:bodyPr/>
+          <a:lstStyle/>
+          <a:p>
+            <a:r>
+              <a:rPr lang="en-US" dirty="0"/>
+              <a:t>Compiling and Running Code</a:t>
+            </a:r>
+          </a:p>
+        </p:txBody>
+      </p:sp>
+      <p:sp>
+        <p:nvSpPr>
+          <p:cNvPr id="3" name="Content Placeholder 2">
+            <a:extLst>
+              <a:ext uri="{FF2B5EF4-FFF2-40B4-BE49-F238E27FC236}">
+                <a16:creationId xmlns:a16="http://schemas.microsoft.com/office/drawing/2014/main" id="{B33D92C7-AA3A-4337-9E11-44E3F280ABFF}"/>
+              </a:ext>
+            </a:extLst>
+          </p:cNvPr>
+          <p:cNvSpPr>
+            <a:spLocks noGrp="1"/>
+          </p:cNvSpPr>
+          <p:nvPr>
+            <p:ph idx="1"/>
+          </p:nvPr>
+        </p:nvSpPr>
+        <p:spPr/>
+        <p:txBody>
+          <a:bodyPr/>
+          <a:lstStyle/>
+          <a:p>
+            <a:r>
+              <a:rPr lang="en-US" dirty="0"/>
+              <a:t>To compile code you use the following command</a:t>
+            </a:r>
+          </a:p>
+          <a:p>
+            <a:pPr lvl="1"/>
+            <a:r>
+              <a:rPr lang="en-US" dirty="0"/>
+              <a:t>g++ -o &lt;name of executable&gt; &lt;name of </a:t>
+            </a:r>
+            <a:r>
+              <a:rPr lang="en-US" dirty="0" err="1"/>
+              <a:t>cpp</a:t>
+            </a:r>
+            <a:r>
+              <a:rPr lang="en-US" dirty="0"/>
+              <a:t> file&gt;</a:t>
+            </a:r>
+          </a:p>
+          <a:p>
+            <a:pPr lvl="2"/>
+            <a:r>
+              <a:rPr lang="en-US" dirty="0" err="1"/>
+              <a:t>eg</a:t>
+            </a:r>
+            <a:r>
+              <a:rPr lang="en-US" dirty="0"/>
+              <a:t>: g++ -o test test.cpp</a:t>
+            </a:r>
+          </a:p>
+          <a:p>
+            <a:r>
+              <a:rPr lang="en-US" dirty="0"/>
+              <a:t>To run the executable and test your code you use</a:t>
+            </a:r>
+          </a:p>
+          <a:p>
+            <a:pPr lvl="1"/>
+            <a:r>
+              <a:rPr lang="en-US" dirty="0"/>
+              <a:t>./&lt;name of executable&gt;</a:t>
+            </a:r>
+          </a:p>
+          <a:p>
+            <a:pPr lvl="2"/>
+            <a:r>
+              <a:rPr lang="en-US" dirty="0" err="1"/>
+              <a:t>eg</a:t>
+            </a:r>
+            <a:r>
+              <a:rPr lang="en-US" dirty="0"/>
+              <a:t>: ./test</a:t>
+            </a:r>
+          </a:p>
+          <a:p>
+            <a:pPr lvl="2" algn="r"/>
+            <a:endParaRPr lang="en-US" dirty="0"/>
+          </a:p>
+        </p:txBody>
+      </p:sp>
+    </p:spTree>
+    <p:extLst>
+      <p:ext uri="{BB962C8B-B14F-4D97-AF65-F5344CB8AC3E}">
+        <p14:creationId xmlns:p14="http://schemas.microsoft.com/office/powerpoint/2010/main" val="3682833038"/>
+      </p:ext>
+    </p:extLst>
+  </p:cSld>
+  <p:clrMapOvr>
+    <a:masterClrMapping/>
+  </p:clrMapOvr>
+</p:sld>
+</file>
+
 <file path=ppt/slides/slide2.xml><?xml version="1.0" encoding="utf-8"?>
 <p:sld xmlns:a="http://schemas.openxmlformats.org/drawingml/2006/main" xmlns:r="http://schemas.openxmlformats.org/officeDocument/2006/relationships" xmlns:p="http://schemas.openxmlformats.org/presentationml/2006/main">
   <p:cSld>
@@ -3644,6 +3788,27 @@
         <p:txBody>
           <a:bodyPr/>
           <a:lstStyle/>
+          <a:p>
+            <a:r>
+              <a:rPr lang="en-US" dirty="0">
+                <a:solidFill>
+                  <a:srgbClr val="5A504A"/>
+                </a:solidFill>
+              </a:rPr>
+              <a:t>Cisco AnyConnect</a:t>
+            </a:r>
+          </a:p>
+          <a:p>
+            <a:pPr lvl="1"/>
+            <a:r>
+              <a:rPr lang="en-US" dirty="0">
+                <a:solidFill>
+                  <a:srgbClr val="5A504A"/>
+                </a:solidFill>
+              </a:rPr>
+              <a:t>Used as VPN</a:t>
+            </a:r>
+          </a:p>
           <a:p>
             <a:r>
               <a:rPr lang="en-US" dirty="0">
@@ -4531,6 +4696,544 @@
     <p:extLst>
       <p:ext uri="{BB962C8B-B14F-4D97-AF65-F5344CB8AC3E}">
         <p14:creationId xmlns:p14="http://schemas.microsoft.com/office/powerpoint/2010/main" val="2310727742"/>
+      </p:ext>
+    </p:extLst>
+  </p:cSld>
+  <p:clrMapOvr>
+    <a:masterClrMapping/>
+  </p:clrMapOvr>
+</p:sld>
+</file>
+
+<file path=ppt/slides/slide7.xml><?xml version="1.0" encoding="utf-8"?>
+<p:sld xmlns:a="http://schemas.openxmlformats.org/drawingml/2006/main" xmlns:r="http://schemas.openxmlformats.org/officeDocument/2006/relationships" xmlns:p="http://schemas.openxmlformats.org/presentationml/2006/main">
+  <p:cSld>
+    <p:spTree>
+      <p:nvGrpSpPr>
+        <p:cNvPr id="1" name=""/>
+        <p:cNvGrpSpPr/>
+        <p:nvPr/>
+      </p:nvGrpSpPr>
+      <p:grpSpPr>
+        <a:xfrm>
+          <a:off x="0" y="0"/>
+          <a:ext cx="0" cy="0"/>
+          <a:chOff x="0" y="0"/>
+          <a:chExt cx="0" cy="0"/>
+        </a:xfrm>
+      </p:grpSpPr>
+      <p:sp>
+        <p:nvSpPr>
+          <p:cNvPr id="2" name="Title 1">
+            <a:extLst>
+              <a:ext uri="{FF2B5EF4-FFF2-40B4-BE49-F238E27FC236}">
+                <a16:creationId xmlns:a16="http://schemas.microsoft.com/office/drawing/2014/main" id="{E23E2CF8-5305-4804-A685-3EBE2824A3AF}"/>
+              </a:ext>
+            </a:extLst>
+          </p:cNvPr>
+          <p:cNvSpPr>
+            <a:spLocks noGrp="1"/>
+          </p:cNvSpPr>
+          <p:nvPr>
+            <p:ph type="title"/>
+          </p:nvPr>
+        </p:nvSpPr>
+        <p:spPr/>
+        <p:txBody>
+          <a:bodyPr/>
+          <a:lstStyle/>
+          <a:p>
+            <a:r>
+              <a:rPr lang="en-US" dirty="0"/>
+              <a:t>Using the System</a:t>
+            </a:r>
+          </a:p>
+        </p:txBody>
+      </p:sp>
+      <p:sp>
+        <p:nvSpPr>
+          <p:cNvPr id="3" name="Content Placeholder 2">
+            <a:extLst>
+              <a:ext uri="{FF2B5EF4-FFF2-40B4-BE49-F238E27FC236}">
+                <a16:creationId xmlns:a16="http://schemas.microsoft.com/office/drawing/2014/main" id="{B33D92C7-AA3A-4337-9E11-44E3F280ABFF}"/>
+              </a:ext>
+            </a:extLst>
+          </p:cNvPr>
+          <p:cNvSpPr>
+            <a:spLocks noGrp="1"/>
+          </p:cNvSpPr>
+          <p:nvPr>
+            <p:ph idx="1"/>
+          </p:nvPr>
+        </p:nvSpPr>
+        <p:spPr>
+          <a:xfrm>
+            <a:off x="838200" y="1825624"/>
+            <a:ext cx="10515600" cy="4824557"/>
+          </a:xfrm>
+        </p:spPr>
+        <p:txBody>
+          <a:bodyPr>
+            <a:normAutofit/>
+          </a:bodyPr>
+          <a:lstStyle/>
+          <a:p>
+            <a:r>
+              <a:rPr lang="en-US" dirty="0"/>
+              <a:t>The servers run on a command line interface</a:t>
+            </a:r>
+          </a:p>
+          <a:p>
+            <a:pPr lvl="1"/>
+            <a:r>
+              <a:rPr lang="en-US" dirty="0"/>
+              <a:t>The system provides a set of commands to navigate and use the system</a:t>
+            </a:r>
+          </a:p>
+          <a:p>
+            <a:pPr lvl="1"/>
+            <a:r>
+              <a:rPr lang="en-US" dirty="0"/>
+              <a:t>The alternative is providing a graphical interface like Windows or MacOS</a:t>
+            </a:r>
+          </a:p>
+          <a:p>
+            <a:r>
+              <a:rPr lang="en-US" dirty="0"/>
+              <a:t>Navigating the file system:</a:t>
+            </a:r>
+          </a:p>
+          <a:p>
+            <a:pPr lvl="1"/>
+            <a:r>
+              <a:rPr lang="en-US" dirty="0"/>
+              <a:t>ls: Print the current directory</a:t>
+            </a:r>
+          </a:p>
+          <a:p>
+            <a:pPr lvl="1"/>
+            <a:r>
+              <a:rPr lang="en-US" dirty="0" err="1"/>
+              <a:t>mkdir</a:t>
+            </a:r>
+            <a:r>
+              <a:rPr lang="en-US" dirty="0"/>
+              <a:t> &lt;</a:t>
+            </a:r>
+            <a:r>
+              <a:rPr lang="en-US" dirty="0" err="1"/>
+              <a:t>dir</a:t>
+            </a:r>
+            <a:r>
+              <a:rPr lang="en-US" dirty="0"/>
+              <a:t>&gt;: Create a directory with the name “</a:t>
+            </a:r>
+            <a:r>
+              <a:rPr lang="en-US" dirty="0" err="1"/>
+              <a:t>dir</a:t>
+            </a:r>
+            <a:r>
+              <a:rPr lang="en-US" dirty="0"/>
+              <a:t>”</a:t>
+            </a:r>
+          </a:p>
+          <a:p>
+            <a:pPr lvl="1"/>
+            <a:r>
+              <a:rPr lang="en-US" dirty="0"/>
+              <a:t>cd &lt;</a:t>
+            </a:r>
+            <a:r>
+              <a:rPr lang="en-US" dirty="0" err="1"/>
+              <a:t>dir</a:t>
+            </a:r>
+            <a:r>
+              <a:rPr lang="en-US" dirty="0"/>
+              <a:t>&gt;: Go into the directory with the name “</a:t>
+            </a:r>
+            <a:r>
+              <a:rPr lang="en-US" dirty="0" err="1"/>
+              <a:t>dir</a:t>
+            </a:r>
+            <a:r>
+              <a:rPr lang="en-US" dirty="0"/>
+              <a:t>”</a:t>
+            </a:r>
+          </a:p>
+          <a:p>
+            <a:pPr lvl="1"/>
+            <a:r>
+              <a:rPr lang="en-US" dirty="0"/>
+              <a:t>emacs &lt;file&gt;: Modify or create a file with name “file”</a:t>
+            </a:r>
+          </a:p>
+          <a:p>
+            <a:pPr lvl="2"/>
+            <a:r>
+              <a:rPr lang="en-US" dirty="0"/>
+              <a:t>This is a text editor used to write files</a:t>
+            </a:r>
+          </a:p>
+          <a:p>
+            <a:pPr lvl="2"/>
+            <a:r>
+              <a:rPr lang="en-US" dirty="0"/>
+              <a:t>Has lots of integrated commands</a:t>
+            </a:r>
+          </a:p>
+        </p:txBody>
+      </p:sp>
+    </p:spTree>
+    <p:extLst>
+      <p:ext uri="{BB962C8B-B14F-4D97-AF65-F5344CB8AC3E}">
+        <p14:creationId xmlns:p14="http://schemas.microsoft.com/office/powerpoint/2010/main" val="234949034"/>
+      </p:ext>
+    </p:extLst>
+  </p:cSld>
+  <p:clrMapOvr>
+    <a:masterClrMapping/>
+  </p:clrMapOvr>
+</p:sld>
+</file>
+
+<file path=ppt/slides/slide8.xml><?xml version="1.0" encoding="utf-8"?>
+<p:sld xmlns:a="http://schemas.openxmlformats.org/drawingml/2006/main" xmlns:r="http://schemas.openxmlformats.org/officeDocument/2006/relationships" xmlns:p="http://schemas.openxmlformats.org/presentationml/2006/main">
+  <p:cSld>
+    <p:spTree>
+      <p:nvGrpSpPr>
+        <p:cNvPr id="1" name=""/>
+        <p:cNvGrpSpPr/>
+        <p:nvPr/>
+      </p:nvGrpSpPr>
+      <p:grpSpPr>
+        <a:xfrm>
+          <a:off x="0" y="0"/>
+          <a:ext cx="0" cy="0"/>
+          <a:chOff x="0" y="0"/>
+          <a:chExt cx="0" cy="0"/>
+        </a:xfrm>
+      </p:grpSpPr>
+      <p:sp>
+        <p:nvSpPr>
+          <p:cNvPr id="2" name="Title 1">
+            <a:extLst>
+              <a:ext uri="{FF2B5EF4-FFF2-40B4-BE49-F238E27FC236}">
+                <a16:creationId xmlns:a16="http://schemas.microsoft.com/office/drawing/2014/main" id="{7B3A28E6-F6A0-4A13-AC8B-EFA8F774FDFD}"/>
+              </a:ext>
+            </a:extLst>
+          </p:cNvPr>
+          <p:cNvSpPr>
+            <a:spLocks noGrp="1"/>
+          </p:cNvSpPr>
+          <p:nvPr>
+            <p:ph type="title"/>
+          </p:nvPr>
+        </p:nvSpPr>
+        <p:spPr>
+          <a:xfrm>
+            <a:off x="838200" y="365125"/>
+            <a:ext cx="10515600" cy="1325563"/>
+          </a:xfrm>
+        </p:spPr>
+        <p:txBody>
+          <a:bodyPr/>
+          <a:lstStyle/>
+          <a:p>
+            <a:r>
+              <a:rPr lang="en-US"/>
+              <a:t>Getting Files on the Server: Windows</a:t>
+            </a:r>
+            <a:endParaRPr lang="en-US" dirty="0"/>
+          </a:p>
+        </p:txBody>
+      </p:sp>
+      <p:pic>
+        <p:nvPicPr>
+          <p:cNvPr id="5" name="Content Placeholder 4">
+            <a:extLst>
+              <a:ext uri="{FF2B5EF4-FFF2-40B4-BE49-F238E27FC236}">
+                <a16:creationId xmlns:a16="http://schemas.microsoft.com/office/drawing/2014/main" id="{D1F9AB47-2B43-4750-8FBC-30D7F6BB438A}"/>
+              </a:ext>
+            </a:extLst>
+          </p:cNvPr>
+          <p:cNvPicPr>
+            <a:picLocks noGrp="1" noChangeAspect="1"/>
+          </p:cNvPicPr>
+          <p:nvPr>
+            <p:ph idx="1"/>
+          </p:nvPr>
+        </p:nvPicPr>
+        <p:blipFill>
+          <a:blip r:embed="rId2">
+            <a:extLst>
+              <a:ext uri="{28A0092B-C50C-407E-A947-70E740481C1C}">
+                <a14:useLocalDpi xmlns:a14="http://schemas.microsoft.com/office/drawing/2010/main" val="0"/>
+              </a:ext>
+            </a:extLst>
+          </a:blip>
+          <a:stretch>
+            <a:fillRect/>
+          </a:stretch>
+        </p:blipFill>
+        <p:spPr>
+          <a:xfrm>
+            <a:off x="8041609" y="2295651"/>
+            <a:ext cx="3460928" cy="2806844"/>
+          </a:xfrm>
+        </p:spPr>
+      </p:pic>
+      <p:pic>
+        <p:nvPicPr>
+          <p:cNvPr id="7" name="Picture 6">
+            <a:extLst>
+              <a:ext uri="{FF2B5EF4-FFF2-40B4-BE49-F238E27FC236}">
+                <a16:creationId xmlns:a16="http://schemas.microsoft.com/office/drawing/2014/main" id="{2F2EEACF-4732-4126-A002-2C3B623BC915}"/>
+              </a:ext>
+            </a:extLst>
+          </p:cNvPr>
+          <p:cNvPicPr>
+            <a:picLocks noChangeAspect="1"/>
+          </p:cNvPicPr>
+          <p:nvPr/>
+        </p:nvPicPr>
+        <p:blipFill>
+          <a:blip r:embed="rId3">
+            <a:extLst>
+              <a:ext uri="{28A0092B-C50C-407E-A947-70E740481C1C}">
+                <a14:useLocalDpi xmlns:a14="http://schemas.microsoft.com/office/drawing/2010/main" val="0"/>
+              </a:ext>
+            </a:extLst>
+          </a:blip>
+          <a:stretch>
+            <a:fillRect/>
+          </a:stretch>
+        </p:blipFill>
+        <p:spPr>
+          <a:xfrm>
+            <a:off x="291569" y="1867004"/>
+            <a:ext cx="5886753" cy="3664138"/>
+          </a:xfrm>
+          <a:prstGeom prst="rect">
+            <a:avLst/>
+          </a:prstGeom>
+        </p:spPr>
+      </p:pic>
+      <p:cxnSp>
+        <p:nvCxnSpPr>
+          <p:cNvPr id="9" name="Straight Arrow Connector 8">
+            <a:extLst>
+              <a:ext uri="{FF2B5EF4-FFF2-40B4-BE49-F238E27FC236}">
+                <a16:creationId xmlns:a16="http://schemas.microsoft.com/office/drawing/2014/main" id="{0AB0067E-7786-4F42-91AE-E0ECE8DAAA85}"/>
+              </a:ext>
+            </a:extLst>
+          </p:cNvPr>
+          <p:cNvCxnSpPr/>
+          <p:nvPr/>
+        </p:nvCxnSpPr>
+        <p:spPr>
+          <a:xfrm>
+            <a:off x="6373091" y="3699073"/>
+            <a:ext cx="1468582" cy="0"/>
+          </a:xfrm>
+          <a:prstGeom prst="straightConnector1">
+            <a:avLst/>
+          </a:prstGeom>
+          <a:ln>
+            <a:tailEnd type="triangle"/>
+          </a:ln>
+        </p:spPr>
+        <p:style>
+          <a:lnRef idx="3">
+            <a:schemeClr val="accent5"/>
+          </a:lnRef>
+          <a:fillRef idx="0">
+            <a:schemeClr val="accent5"/>
+          </a:fillRef>
+          <a:effectRef idx="2">
+            <a:schemeClr val="accent5"/>
+          </a:effectRef>
+          <a:fontRef idx="minor">
+            <a:schemeClr val="tx1"/>
+          </a:fontRef>
+        </p:style>
+      </p:cxnSp>
+    </p:spTree>
+    <p:extLst>
+      <p:ext uri="{BB962C8B-B14F-4D97-AF65-F5344CB8AC3E}">
+        <p14:creationId xmlns:p14="http://schemas.microsoft.com/office/powerpoint/2010/main" val="3984108541"/>
+      </p:ext>
+    </p:extLst>
+  </p:cSld>
+  <p:clrMapOvr>
+    <a:masterClrMapping/>
+  </p:clrMapOvr>
+</p:sld>
+</file>
+
+<file path=ppt/slides/slide9.xml><?xml version="1.0" encoding="utf-8"?>
+<p:sld xmlns:a="http://schemas.openxmlformats.org/drawingml/2006/main" xmlns:r="http://schemas.openxmlformats.org/officeDocument/2006/relationships" xmlns:p="http://schemas.openxmlformats.org/presentationml/2006/main">
+  <p:cSld>
+    <p:spTree>
+      <p:nvGrpSpPr>
+        <p:cNvPr id="1" name=""/>
+        <p:cNvGrpSpPr/>
+        <p:nvPr/>
+      </p:nvGrpSpPr>
+      <p:grpSpPr>
+        <a:xfrm>
+          <a:off x="0" y="0"/>
+          <a:ext cx="0" cy="0"/>
+          <a:chOff x="0" y="0"/>
+          <a:chExt cx="0" cy="0"/>
+        </a:xfrm>
+      </p:grpSpPr>
+      <p:sp>
+        <p:nvSpPr>
+          <p:cNvPr id="2" name="Title 1">
+            <a:extLst>
+              <a:ext uri="{FF2B5EF4-FFF2-40B4-BE49-F238E27FC236}">
+                <a16:creationId xmlns:a16="http://schemas.microsoft.com/office/drawing/2014/main" id="{7B3A28E6-F6A0-4A13-AC8B-EFA8F774FDFD}"/>
+              </a:ext>
+            </a:extLst>
+          </p:cNvPr>
+          <p:cNvSpPr>
+            <a:spLocks noGrp="1"/>
+          </p:cNvSpPr>
+          <p:nvPr>
+            <p:ph type="title"/>
+          </p:nvPr>
+        </p:nvSpPr>
+        <p:spPr>
+          <a:xfrm>
+            <a:off x="838200" y="365125"/>
+            <a:ext cx="10515600" cy="1325563"/>
+          </a:xfrm>
+        </p:spPr>
+        <p:txBody>
+          <a:bodyPr/>
+          <a:lstStyle/>
+          <a:p>
+            <a:r>
+              <a:rPr lang="en-US"/>
+              <a:t>Getting Files on the Server: Windows</a:t>
+            </a:r>
+            <a:endParaRPr lang="en-US" dirty="0"/>
+          </a:p>
+        </p:txBody>
+      </p:sp>
+      <p:pic>
+        <p:nvPicPr>
+          <p:cNvPr id="7" name="Picture 6">
+            <a:extLst>
+              <a:ext uri="{FF2B5EF4-FFF2-40B4-BE49-F238E27FC236}">
+                <a16:creationId xmlns:a16="http://schemas.microsoft.com/office/drawing/2014/main" id="{2F2EEACF-4732-4126-A002-2C3B623BC915}"/>
+              </a:ext>
+            </a:extLst>
+          </p:cNvPr>
+          <p:cNvPicPr>
+            <a:picLocks noChangeAspect="1"/>
+          </p:cNvPicPr>
+          <p:nvPr/>
+        </p:nvPicPr>
+        <p:blipFill>
+          <a:blip r:embed="rId2">
+            <a:extLst>
+              <a:ext uri="{28A0092B-C50C-407E-A947-70E740481C1C}">
+                <a14:useLocalDpi xmlns:a14="http://schemas.microsoft.com/office/drawing/2010/main" val="0"/>
+              </a:ext>
+            </a:extLst>
+          </a:blip>
+          <a:stretch>
+            <a:fillRect/>
+          </a:stretch>
+        </p:blipFill>
+        <p:spPr>
+          <a:xfrm>
+            <a:off x="1115950" y="1690688"/>
+            <a:ext cx="5699428" cy="4692353"/>
+          </a:xfrm>
+          <a:prstGeom prst="rect">
+            <a:avLst/>
+          </a:prstGeom>
+        </p:spPr>
+      </p:pic>
+      <p:sp>
+        <p:nvSpPr>
+          <p:cNvPr id="8" name="Content Placeholder 2">
+            <a:extLst>
+              <a:ext uri="{FF2B5EF4-FFF2-40B4-BE49-F238E27FC236}">
+                <a16:creationId xmlns:a16="http://schemas.microsoft.com/office/drawing/2014/main" id="{4AEBE0E1-929A-439D-AE65-049D51921C71}"/>
+              </a:ext>
+            </a:extLst>
+          </p:cNvPr>
+          <p:cNvSpPr>
+            <a:spLocks noGrp="1"/>
+          </p:cNvSpPr>
+          <p:nvPr>
+            <p:ph sz="half" idx="1"/>
+          </p:nvPr>
+        </p:nvSpPr>
+        <p:spPr>
+          <a:xfrm>
+            <a:off x="7198822" y="2520019"/>
+            <a:ext cx="4596015" cy="3206526"/>
+          </a:xfrm>
+        </p:spPr>
+        <p:txBody>
+          <a:bodyPr>
+            <a:normAutofit/>
+          </a:bodyPr>
+          <a:lstStyle/>
+          <a:p>
+            <a:r>
+              <a:rPr lang="en-US" dirty="0">
+                <a:solidFill>
+                  <a:srgbClr val="5A504A"/>
+                </a:solidFill>
+              </a:rPr>
+              <a:t>The left is your local computer file system</a:t>
+            </a:r>
+          </a:p>
+          <a:p>
+            <a:r>
+              <a:rPr lang="en-US" dirty="0">
+                <a:solidFill>
+                  <a:srgbClr val="5A504A"/>
+                </a:solidFill>
+              </a:rPr>
+              <a:t>The right is the Linux server file system</a:t>
+            </a:r>
+          </a:p>
+          <a:p>
+            <a:r>
+              <a:rPr lang="en-US" dirty="0">
+                <a:solidFill>
+                  <a:srgbClr val="5A504A"/>
+                </a:solidFill>
+              </a:rPr>
+              <a:t>You could easily drag and drop across both</a:t>
+            </a:r>
+          </a:p>
+          <a:p>
+            <a:endParaRPr lang="en-US" dirty="0">
+              <a:solidFill>
+                <a:srgbClr val="5A504A"/>
+              </a:solidFill>
+            </a:endParaRPr>
+          </a:p>
+          <a:p>
+            <a:endParaRPr lang="en-US" dirty="0">
+              <a:solidFill>
+                <a:srgbClr val="5A504A"/>
+              </a:solidFill>
+            </a:endParaRPr>
+          </a:p>
+        </p:txBody>
+      </p:sp>
+    </p:spTree>
+    <p:extLst>
+      <p:ext uri="{BB962C8B-B14F-4D97-AF65-F5344CB8AC3E}">
+        <p14:creationId xmlns:p14="http://schemas.microsoft.com/office/powerpoint/2010/main" val="1009855385"/>
       </p:ext>
     </p:extLst>
   </p:cSld>

</xml_diff>

<commit_message>
Revised Week 3 PPT
</commit_message>
<xml_diff>
--- a/Week-3/Using the Linux Servers.pptx
+++ b/Week-3/Using the Linux Servers.pptx
@@ -8,13 +8,21 @@
     <p:sldId id="256" r:id="rId2"/>
     <p:sldId id="258" r:id="rId3"/>
     <p:sldId id="257" r:id="rId4"/>
-    <p:sldId id="259" r:id="rId5"/>
-    <p:sldId id="260" r:id="rId6"/>
-    <p:sldId id="261" r:id="rId7"/>
-    <p:sldId id="262" r:id="rId8"/>
-    <p:sldId id="264" r:id="rId9"/>
-    <p:sldId id="265" r:id="rId10"/>
-    <p:sldId id="263" r:id="rId11"/>
+    <p:sldId id="266" r:id="rId5"/>
+    <p:sldId id="267" r:id="rId6"/>
+    <p:sldId id="259" r:id="rId7"/>
+    <p:sldId id="260" r:id="rId8"/>
+    <p:sldId id="261" r:id="rId9"/>
+    <p:sldId id="269" r:id="rId10"/>
+    <p:sldId id="270" r:id="rId11"/>
+    <p:sldId id="264" r:id="rId12"/>
+    <p:sldId id="271" r:id="rId13"/>
+    <p:sldId id="265" r:id="rId14"/>
+    <p:sldId id="272" r:id="rId15"/>
+    <p:sldId id="273" r:id="rId16"/>
+    <p:sldId id="262" r:id="rId17"/>
+    <p:sldId id="263" r:id="rId18"/>
+    <p:sldId id="268" r:id="rId19"/>
   </p:sldIdLst>
   <p:sldSz cx="12192000" cy="6858000"/>
   <p:notesSz cx="6858000" cy="9144000"/>
@@ -3452,6 +3460,1558 @@
           <p:cNvPr id="2" name="Title 1">
             <a:extLst>
               <a:ext uri="{FF2B5EF4-FFF2-40B4-BE49-F238E27FC236}">
+                <a16:creationId xmlns:a16="http://schemas.microsoft.com/office/drawing/2014/main" id="{0DE1D5C6-A209-48F2-B95E-F4E7DCD2EFBB}"/>
+              </a:ext>
+            </a:extLst>
+          </p:cNvPr>
+          <p:cNvSpPr>
+            <a:spLocks noGrp="1"/>
+          </p:cNvSpPr>
+          <p:nvPr>
+            <p:ph type="title"/>
+          </p:nvPr>
+        </p:nvSpPr>
+        <p:spPr/>
+        <p:txBody>
+          <a:bodyPr/>
+          <a:lstStyle/>
+          <a:p>
+            <a:r>
+              <a:rPr lang="en-US" dirty="0"/>
+              <a:t>Signing In: MacOS</a:t>
+            </a:r>
+          </a:p>
+        </p:txBody>
+      </p:sp>
+      <p:pic>
+        <p:nvPicPr>
+          <p:cNvPr id="5" name="Picture 4">
+            <a:extLst>
+              <a:ext uri="{FF2B5EF4-FFF2-40B4-BE49-F238E27FC236}">
+                <a16:creationId xmlns:a16="http://schemas.microsoft.com/office/drawing/2014/main" id="{F2CF58C9-B860-4C96-86E3-D8BEB1A03CEF}"/>
+              </a:ext>
+            </a:extLst>
+          </p:cNvPr>
+          <p:cNvPicPr>
+            <a:picLocks noChangeAspect="1"/>
+          </p:cNvPicPr>
+          <p:nvPr/>
+        </p:nvPicPr>
+        <p:blipFill>
+          <a:blip r:embed="rId2">
+            <a:extLst>
+              <a:ext uri="{28A0092B-C50C-407E-A947-70E740481C1C}">
+                <a14:useLocalDpi xmlns:a14="http://schemas.microsoft.com/office/drawing/2010/main" val="0"/>
+              </a:ext>
+            </a:extLst>
+          </a:blip>
+          <a:stretch>
+            <a:fillRect/>
+          </a:stretch>
+        </p:blipFill>
+        <p:spPr>
+          <a:xfrm>
+            <a:off x="838200" y="1816812"/>
+            <a:ext cx="5594001" cy="3749729"/>
+          </a:xfrm>
+          <a:prstGeom prst="rect">
+            <a:avLst/>
+          </a:prstGeom>
+        </p:spPr>
+      </p:pic>
+      <p:sp>
+        <p:nvSpPr>
+          <p:cNvPr id="9" name="Content Placeholder 2">
+            <a:extLst>
+              <a:ext uri="{FF2B5EF4-FFF2-40B4-BE49-F238E27FC236}">
+                <a16:creationId xmlns:a16="http://schemas.microsoft.com/office/drawing/2014/main" id="{91B1BBF6-3BC0-49D0-811D-B0E3E97BA898}"/>
+              </a:ext>
+            </a:extLst>
+          </p:cNvPr>
+          <p:cNvSpPr>
+            <a:spLocks noGrp="1"/>
+          </p:cNvSpPr>
+          <p:nvPr>
+            <p:ph sz="half" idx="1"/>
+          </p:nvPr>
+        </p:nvSpPr>
+        <p:spPr>
+          <a:xfrm>
+            <a:off x="7591430" y="3095403"/>
+            <a:ext cx="4377050" cy="940298"/>
+          </a:xfrm>
+        </p:spPr>
+        <p:txBody>
+          <a:bodyPr>
+            <a:normAutofit/>
+          </a:bodyPr>
+          <a:lstStyle/>
+          <a:p>
+            <a:pPr marL="0" indent="0">
+              <a:buNone/>
+            </a:pPr>
+            <a:r>
+              <a:rPr lang="en-US" dirty="0">
+                <a:solidFill>
+                  <a:srgbClr val="5A504A"/>
+                </a:solidFill>
+              </a:rPr>
+              <a:t>If you see a page similar to this, you are done!</a:t>
+            </a:r>
+          </a:p>
+          <a:p>
+            <a:endParaRPr lang="en-US" dirty="0">
+              <a:solidFill>
+                <a:srgbClr val="5A504A"/>
+              </a:solidFill>
+            </a:endParaRPr>
+          </a:p>
+        </p:txBody>
+      </p:sp>
+    </p:spTree>
+    <p:extLst>
+      <p:ext uri="{BB962C8B-B14F-4D97-AF65-F5344CB8AC3E}">
+        <p14:creationId xmlns:p14="http://schemas.microsoft.com/office/powerpoint/2010/main" val="2610688188"/>
+      </p:ext>
+    </p:extLst>
+  </p:cSld>
+  <p:clrMapOvr>
+    <a:masterClrMapping/>
+  </p:clrMapOvr>
+</p:sld>
+</file>
+
+<file path=ppt/slides/slide11.xml><?xml version="1.0" encoding="utf-8"?>
+<p:sld xmlns:a="http://schemas.openxmlformats.org/drawingml/2006/main" xmlns:r="http://schemas.openxmlformats.org/officeDocument/2006/relationships" xmlns:p="http://schemas.openxmlformats.org/presentationml/2006/main">
+  <p:cSld>
+    <p:spTree>
+      <p:nvGrpSpPr>
+        <p:cNvPr id="1" name=""/>
+        <p:cNvGrpSpPr/>
+        <p:nvPr/>
+      </p:nvGrpSpPr>
+      <p:grpSpPr>
+        <a:xfrm>
+          <a:off x="0" y="0"/>
+          <a:ext cx="0" cy="0"/>
+          <a:chOff x="0" y="0"/>
+          <a:chExt cx="0" cy="0"/>
+        </a:xfrm>
+      </p:grpSpPr>
+      <p:sp>
+        <p:nvSpPr>
+          <p:cNvPr id="2" name="Title 1">
+            <a:extLst>
+              <a:ext uri="{FF2B5EF4-FFF2-40B4-BE49-F238E27FC236}">
+                <a16:creationId xmlns:a16="http://schemas.microsoft.com/office/drawing/2014/main" id="{7B3A28E6-F6A0-4A13-AC8B-EFA8F774FDFD}"/>
+              </a:ext>
+            </a:extLst>
+          </p:cNvPr>
+          <p:cNvSpPr>
+            <a:spLocks noGrp="1"/>
+          </p:cNvSpPr>
+          <p:nvPr>
+            <p:ph type="title"/>
+          </p:nvPr>
+        </p:nvSpPr>
+        <p:spPr>
+          <a:xfrm>
+            <a:off x="838200" y="365125"/>
+            <a:ext cx="10515600" cy="1325563"/>
+          </a:xfrm>
+        </p:spPr>
+        <p:txBody>
+          <a:bodyPr/>
+          <a:lstStyle/>
+          <a:p>
+            <a:r>
+              <a:rPr lang="en-US"/>
+              <a:t>Getting Files on the Server: Windows</a:t>
+            </a:r>
+            <a:endParaRPr lang="en-US" dirty="0"/>
+          </a:p>
+        </p:txBody>
+      </p:sp>
+      <p:pic>
+        <p:nvPicPr>
+          <p:cNvPr id="7" name="Picture 6">
+            <a:extLst>
+              <a:ext uri="{FF2B5EF4-FFF2-40B4-BE49-F238E27FC236}">
+                <a16:creationId xmlns:a16="http://schemas.microsoft.com/office/drawing/2014/main" id="{2F2EEACF-4732-4126-A002-2C3B623BC915}"/>
+              </a:ext>
+            </a:extLst>
+          </p:cNvPr>
+          <p:cNvPicPr>
+            <a:picLocks noChangeAspect="1"/>
+          </p:cNvPicPr>
+          <p:nvPr/>
+        </p:nvPicPr>
+        <p:blipFill>
+          <a:blip r:embed="rId2">
+            <a:extLst>
+              <a:ext uri="{28A0092B-C50C-407E-A947-70E740481C1C}">
+                <a14:useLocalDpi xmlns:a14="http://schemas.microsoft.com/office/drawing/2010/main" val="0"/>
+              </a:ext>
+            </a:extLst>
+          </a:blip>
+          <a:stretch>
+            <a:fillRect/>
+          </a:stretch>
+        </p:blipFill>
+        <p:spPr>
+          <a:xfrm>
+            <a:off x="354631" y="1690688"/>
+            <a:ext cx="6809653" cy="4221696"/>
+          </a:xfrm>
+          <a:prstGeom prst="rect">
+            <a:avLst/>
+          </a:prstGeom>
+        </p:spPr>
+      </p:pic>
+      <p:sp>
+        <p:nvSpPr>
+          <p:cNvPr id="12" name="Content Placeholder 2">
+            <a:extLst>
+              <a:ext uri="{FF2B5EF4-FFF2-40B4-BE49-F238E27FC236}">
+                <a16:creationId xmlns:a16="http://schemas.microsoft.com/office/drawing/2014/main" id="{B0A0E437-BECC-4C31-B453-F4C43805AF59}"/>
+              </a:ext>
+            </a:extLst>
+          </p:cNvPr>
+          <p:cNvSpPr>
+            <a:spLocks noGrp="1"/>
+          </p:cNvSpPr>
+          <p:nvPr>
+            <p:ph sz="half" idx="1"/>
+          </p:nvPr>
+        </p:nvSpPr>
+        <p:spPr>
+          <a:xfrm>
+            <a:off x="7313228" y="2423448"/>
+            <a:ext cx="4628496" cy="2756175"/>
+          </a:xfrm>
+        </p:spPr>
+        <p:txBody>
+          <a:bodyPr>
+            <a:normAutofit/>
+          </a:bodyPr>
+          <a:lstStyle/>
+          <a:p>
+            <a:r>
+              <a:rPr lang="en-US" b="1" dirty="0">
+                <a:solidFill>
+                  <a:srgbClr val="5A504A"/>
+                </a:solidFill>
+              </a:rPr>
+              <a:t>Host name </a:t>
+            </a:r>
+            <a:r>
+              <a:rPr lang="en-US" dirty="0">
+                <a:solidFill>
+                  <a:srgbClr val="5A504A"/>
+                </a:solidFill>
+              </a:rPr>
+              <a:t>is the name of the server we used earlier</a:t>
+            </a:r>
+          </a:p>
+          <a:p>
+            <a:r>
+              <a:rPr lang="en-US" dirty="0">
+                <a:solidFill>
+                  <a:srgbClr val="5A504A"/>
+                </a:solidFill>
+              </a:rPr>
+              <a:t>User name and password are the </a:t>
+            </a:r>
+            <a:r>
+              <a:rPr lang="en-US" dirty="0" err="1">
+                <a:solidFill>
+                  <a:srgbClr val="5A504A"/>
+                </a:solidFill>
+              </a:rPr>
+              <a:t>SEASnet</a:t>
+            </a:r>
+            <a:r>
+              <a:rPr lang="en-US" dirty="0">
+                <a:solidFill>
+                  <a:srgbClr val="5A504A"/>
+                </a:solidFill>
+              </a:rPr>
+              <a:t> credentials</a:t>
+            </a:r>
+          </a:p>
+          <a:p>
+            <a:endParaRPr lang="en-US" dirty="0">
+              <a:solidFill>
+                <a:srgbClr val="5A504A"/>
+              </a:solidFill>
+            </a:endParaRPr>
+          </a:p>
+          <a:p>
+            <a:endParaRPr lang="en-US" dirty="0">
+              <a:solidFill>
+                <a:srgbClr val="5A504A"/>
+              </a:solidFill>
+            </a:endParaRPr>
+          </a:p>
+        </p:txBody>
+      </p:sp>
+    </p:spTree>
+    <p:extLst>
+      <p:ext uri="{BB962C8B-B14F-4D97-AF65-F5344CB8AC3E}">
+        <p14:creationId xmlns:p14="http://schemas.microsoft.com/office/powerpoint/2010/main" val="3984108541"/>
+      </p:ext>
+    </p:extLst>
+  </p:cSld>
+  <p:clrMapOvr>
+    <a:masterClrMapping/>
+  </p:clrMapOvr>
+</p:sld>
+</file>
+
+<file path=ppt/slides/slide12.xml><?xml version="1.0" encoding="utf-8"?>
+<p:sld xmlns:a="http://schemas.openxmlformats.org/drawingml/2006/main" xmlns:r="http://schemas.openxmlformats.org/officeDocument/2006/relationships" xmlns:p="http://schemas.openxmlformats.org/presentationml/2006/main">
+  <p:cSld>
+    <p:spTree>
+      <p:nvGrpSpPr>
+        <p:cNvPr id="1" name=""/>
+        <p:cNvGrpSpPr/>
+        <p:nvPr/>
+      </p:nvGrpSpPr>
+      <p:grpSpPr>
+        <a:xfrm>
+          <a:off x="0" y="0"/>
+          <a:ext cx="0" cy="0"/>
+          <a:chOff x="0" y="0"/>
+          <a:chExt cx="0" cy="0"/>
+        </a:xfrm>
+      </p:grpSpPr>
+      <p:sp>
+        <p:nvSpPr>
+          <p:cNvPr id="2" name="Title 1">
+            <a:extLst>
+              <a:ext uri="{FF2B5EF4-FFF2-40B4-BE49-F238E27FC236}">
+                <a16:creationId xmlns:a16="http://schemas.microsoft.com/office/drawing/2014/main" id="{7B3A28E6-F6A0-4A13-AC8B-EFA8F774FDFD}"/>
+              </a:ext>
+            </a:extLst>
+          </p:cNvPr>
+          <p:cNvSpPr>
+            <a:spLocks noGrp="1"/>
+          </p:cNvSpPr>
+          <p:nvPr>
+            <p:ph type="title"/>
+          </p:nvPr>
+        </p:nvSpPr>
+        <p:spPr>
+          <a:xfrm>
+            <a:off x="838200" y="365125"/>
+            <a:ext cx="10515600" cy="1325563"/>
+          </a:xfrm>
+        </p:spPr>
+        <p:txBody>
+          <a:bodyPr/>
+          <a:lstStyle/>
+          <a:p>
+            <a:r>
+              <a:rPr lang="en-US" dirty="0"/>
+              <a:t>Getting Files on the Server: Windows</a:t>
+            </a:r>
+          </a:p>
+        </p:txBody>
+      </p:sp>
+      <p:sp>
+        <p:nvSpPr>
+          <p:cNvPr id="12" name="Content Placeholder 2">
+            <a:extLst>
+              <a:ext uri="{FF2B5EF4-FFF2-40B4-BE49-F238E27FC236}">
+                <a16:creationId xmlns:a16="http://schemas.microsoft.com/office/drawing/2014/main" id="{B0A0E437-BECC-4C31-B453-F4C43805AF59}"/>
+              </a:ext>
+            </a:extLst>
+          </p:cNvPr>
+          <p:cNvSpPr>
+            <a:spLocks noGrp="1"/>
+          </p:cNvSpPr>
+          <p:nvPr>
+            <p:ph sz="half" idx="1"/>
+          </p:nvPr>
+        </p:nvSpPr>
+        <p:spPr>
+          <a:xfrm>
+            <a:off x="7208125" y="2516432"/>
+            <a:ext cx="4628496" cy="2756175"/>
+          </a:xfrm>
+        </p:spPr>
+        <p:txBody>
+          <a:bodyPr>
+            <a:normAutofit/>
+          </a:bodyPr>
+          <a:lstStyle/>
+          <a:p>
+            <a:r>
+              <a:rPr lang="en-US" dirty="0">
+                <a:solidFill>
+                  <a:srgbClr val="5A504A"/>
+                </a:solidFill>
+              </a:rPr>
+              <a:t>Before logging in, press save to avoid having to enter all the information next time</a:t>
+            </a:r>
+          </a:p>
+          <a:p>
+            <a:r>
+              <a:rPr lang="en-US" dirty="0">
+                <a:solidFill>
+                  <a:srgbClr val="5A504A"/>
+                </a:solidFill>
+              </a:rPr>
+              <a:t>Click save password </a:t>
+            </a:r>
+          </a:p>
+          <a:p>
+            <a:endParaRPr lang="en-US" dirty="0">
+              <a:solidFill>
+                <a:srgbClr val="5A504A"/>
+              </a:solidFill>
+            </a:endParaRPr>
+          </a:p>
+          <a:p>
+            <a:endParaRPr lang="en-US" dirty="0">
+              <a:solidFill>
+                <a:srgbClr val="5A504A"/>
+              </a:solidFill>
+            </a:endParaRPr>
+          </a:p>
+        </p:txBody>
+      </p:sp>
+      <p:pic>
+        <p:nvPicPr>
+          <p:cNvPr id="4" name="Picture 3">
+            <a:extLst>
+              <a:ext uri="{FF2B5EF4-FFF2-40B4-BE49-F238E27FC236}">
+                <a16:creationId xmlns:a16="http://schemas.microsoft.com/office/drawing/2014/main" id="{9F6485BA-F51C-4556-9231-C688B74F724C}"/>
+              </a:ext>
+            </a:extLst>
+          </p:cNvPr>
+          <p:cNvPicPr>
+            <a:picLocks noChangeAspect="1"/>
+          </p:cNvPicPr>
+          <p:nvPr/>
+        </p:nvPicPr>
+        <p:blipFill>
+          <a:blip r:embed="rId2">
+            <a:extLst>
+              <a:ext uri="{28A0092B-C50C-407E-A947-70E740481C1C}">
+                <a14:useLocalDpi xmlns:a14="http://schemas.microsoft.com/office/drawing/2010/main" val="0"/>
+              </a:ext>
+            </a:extLst>
+          </a:blip>
+          <a:stretch>
+            <a:fillRect/>
+          </a:stretch>
+        </p:blipFill>
+        <p:spPr>
+          <a:xfrm>
+            <a:off x="838200" y="2516432"/>
+            <a:ext cx="4669531" cy="2570205"/>
+          </a:xfrm>
+          <a:prstGeom prst="rect">
+            <a:avLst/>
+          </a:prstGeom>
+        </p:spPr>
+      </p:pic>
+    </p:spTree>
+    <p:extLst>
+      <p:ext uri="{BB962C8B-B14F-4D97-AF65-F5344CB8AC3E}">
+        <p14:creationId xmlns:p14="http://schemas.microsoft.com/office/powerpoint/2010/main" val="541050469"/>
+      </p:ext>
+    </p:extLst>
+  </p:cSld>
+  <p:clrMapOvr>
+    <a:masterClrMapping/>
+  </p:clrMapOvr>
+</p:sld>
+</file>
+
+<file path=ppt/slides/slide13.xml><?xml version="1.0" encoding="utf-8"?>
+<p:sld xmlns:a="http://schemas.openxmlformats.org/drawingml/2006/main" xmlns:r="http://schemas.openxmlformats.org/officeDocument/2006/relationships" xmlns:p="http://schemas.openxmlformats.org/presentationml/2006/main">
+  <p:cSld>
+    <p:spTree>
+      <p:nvGrpSpPr>
+        <p:cNvPr id="1" name=""/>
+        <p:cNvGrpSpPr/>
+        <p:nvPr/>
+      </p:nvGrpSpPr>
+      <p:grpSpPr>
+        <a:xfrm>
+          <a:off x="0" y="0"/>
+          <a:ext cx="0" cy="0"/>
+          <a:chOff x="0" y="0"/>
+          <a:chExt cx="0" cy="0"/>
+        </a:xfrm>
+      </p:grpSpPr>
+      <p:sp>
+        <p:nvSpPr>
+          <p:cNvPr id="2" name="Title 1">
+            <a:extLst>
+              <a:ext uri="{FF2B5EF4-FFF2-40B4-BE49-F238E27FC236}">
+                <a16:creationId xmlns:a16="http://schemas.microsoft.com/office/drawing/2014/main" id="{7B3A28E6-F6A0-4A13-AC8B-EFA8F774FDFD}"/>
+              </a:ext>
+            </a:extLst>
+          </p:cNvPr>
+          <p:cNvSpPr>
+            <a:spLocks noGrp="1"/>
+          </p:cNvSpPr>
+          <p:nvPr>
+            <p:ph type="title"/>
+          </p:nvPr>
+        </p:nvSpPr>
+        <p:spPr>
+          <a:xfrm>
+            <a:off x="838200" y="365125"/>
+            <a:ext cx="10515600" cy="1325563"/>
+          </a:xfrm>
+        </p:spPr>
+        <p:txBody>
+          <a:bodyPr/>
+          <a:lstStyle/>
+          <a:p>
+            <a:r>
+              <a:rPr lang="en-US"/>
+              <a:t>Getting Files on the Server: Windows</a:t>
+            </a:r>
+            <a:endParaRPr lang="en-US" dirty="0"/>
+          </a:p>
+        </p:txBody>
+      </p:sp>
+      <p:pic>
+        <p:nvPicPr>
+          <p:cNvPr id="7" name="Picture 6">
+            <a:extLst>
+              <a:ext uri="{FF2B5EF4-FFF2-40B4-BE49-F238E27FC236}">
+                <a16:creationId xmlns:a16="http://schemas.microsoft.com/office/drawing/2014/main" id="{2F2EEACF-4732-4126-A002-2C3B623BC915}"/>
+              </a:ext>
+            </a:extLst>
+          </p:cNvPr>
+          <p:cNvPicPr>
+            <a:picLocks noChangeAspect="1"/>
+          </p:cNvPicPr>
+          <p:nvPr/>
+        </p:nvPicPr>
+        <p:blipFill>
+          <a:blip r:embed="rId2">
+            <a:extLst>
+              <a:ext uri="{28A0092B-C50C-407E-A947-70E740481C1C}">
+                <a14:useLocalDpi xmlns:a14="http://schemas.microsoft.com/office/drawing/2010/main" val="0"/>
+              </a:ext>
+            </a:extLst>
+          </a:blip>
+          <a:stretch>
+            <a:fillRect/>
+          </a:stretch>
+        </p:blipFill>
+        <p:spPr>
+          <a:xfrm>
+            <a:off x="1115950" y="1690688"/>
+            <a:ext cx="5699428" cy="4692353"/>
+          </a:xfrm>
+          <a:prstGeom prst="rect">
+            <a:avLst/>
+          </a:prstGeom>
+        </p:spPr>
+      </p:pic>
+      <p:sp>
+        <p:nvSpPr>
+          <p:cNvPr id="8" name="Content Placeholder 2">
+            <a:extLst>
+              <a:ext uri="{FF2B5EF4-FFF2-40B4-BE49-F238E27FC236}">
+                <a16:creationId xmlns:a16="http://schemas.microsoft.com/office/drawing/2014/main" id="{4AEBE0E1-929A-439D-AE65-049D51921C71}"/>
+              </a:ext>
+            </a:extLst>
+          </p:cNvPr>
+          <p:cNvSpPr>
+            <a:spLocks noGrp="1"/>
+          </p:cNvSpPr>
+          <p:nvPr>
+            <p:ph sz="half" idx="1"/>
+          </p:nvPr>
+        </p:nvSpPr>
+        <p:spPr>
+          <a:xfrm>
+            <a:off x="7198822" y="2520019"/>
+            <a:ext cx="4596015" cy="3206526"/>
+          </a:xfrm>
+        </p:spPr>
+        <p:txBody>
+          <a:bodyPr>
+            <a:normAutofit/>
+          </a:bodyPr>
+          <a:lstStyle/>
+          <a:p>
+            <a:r>
+              <a:rPr lang="en-US" dirty="0">
+                <a:solidFill>
+                  <a:srgbClr val="5A504A"/>
+                </a:solidFill>
+              </a:rPr>
+              <a:t>The left is your local computer file system</a:t>
+            </a:r>
+          </a:p>
+          <a:p>
+            <a:r>
+              <a:rPr lang="en-US" dirty="0">
+                <a:solidFill>
+                  <a:srgbClr val="5A504A"/>
+                </a:solidFill>
+              </a:rPr>
+              <a:t>The right is the Linux server file system</a:t>
+            </a:r>
+          </a:p>
+          <a:p>
+            <a:r>
+              <a:rPr lang="en-US" dirty="0">
+                <a:solidFill>
+                  <a:srgbClr val="5A504A"/>
+                </a:solidFill>
+              </a:rPr>
+              <a:t>You could easily drag and drop across both</a:t>
+            </a:r>
+          </a:p>
+          <a:p>
+            <a:endParaRPr lang="en-US" dirty="0">
+              <a:solidFill>
+                <a:srgbClr val="5A504A"/>
+              </a:solidFill>
+            </a:endParaRPr>
+          </a:p>
+          <a:p>
+            <a:endParaRPr lang="en-US" dirty="0">
+              <a:solidFill>
+                <a:srgbClr val="5A504A"/>
+              </a:solidFill>
+            </a:endParaRPr>
+          </a:p>
+        </p:txBody>
+      </p:sp>
+    </p:spTree>
+    <p:extLst>
+      <p:ext uri="{BB962C8B-B14F-4D97-AF65-F5344CB8AC3E}">
+        <p14:creationId xmlns:p14="http://schemas.microsoft.com/office/powerpoint/2010/main" val="1009855385"/>
+      </p:ext>
+    </p:extLst>
+  </p:cSld>
+  <p:clrMapOvr>
+    <a:masterClrMapping/>
+  </p:clrMapOvr>
+</p:sld>
+</file>
+
+<file path=ppt/slides/slide14.xml><?xml version="1.0" encoding="utf-8"?>
+<p:sld xmlns:a="http://schemas.openxmlformats.org/drawingml/2006/main" xmlns:r="http://schemas.openxmlformats.org/officeDocument/2006/relationships" xmlns:p="http://schemas.openxmlformats.org/presentationml/2006/main">
+  <p:cSld>
+    <p:spTree>
+      <p:nvGrpSpPr>
+        <p:cNvPr id="1" name=""/>
+        <p:cNvGrpSpPr/>
+        <p:nvPr/>
+      </p:nvGrpSpPr>
+      <p:grpSpPr>
+        <a:xfrm>
+          <a:off x="0" y="0"/>
+          <a:ext cx="0" cy="0"/>
+          <a:chOff x="0" y="0"/>
+          <a:chExt cx="0" cy="0"/>
+        </a:xfrm>
+      </p:grpSpPr>
+      <p:sp>
+        <p:nvSpPr>
+          <p:cNvPr id="2" name="Title 1">
+            <a:extLst>
+              <a:ext uri="{FF2B5EF4-FFF2-40B4-BE49-F238E27FC236}">
+                <a16:creationId xmlns:a16="http://schemas.microsoft.com/office/drawing/2014/main" id="{0DE1D5C6-A209-48F2-B95E-F4E7DCD2EFBB}"/>
+              </a:ext>
+            </a:extLst>
+          </p:cNvPr>
+          <p:cNvSpPr>
+            <a:spLocks noGrp="1"/>
+          </p:cNvSpPr>
+          <p:nvPr>
+            <p:ph type="title"/>
+          </p:nvPr>
+        </p:nvSpPr>
+        <p:spPr/>
+        <p:txBody>
+          <a:bodyPr/>
+          <a:lstStyle/>
+          <a:p>
+            <a:r>
+              <a:rPr lang="en-US" dirty="0"/>
+              <a:t>Getting Files on The Server: MacOS</a:t>
+            </a:r>
+          </a:p>
+        </p:txBody>
+      </p:sp>
+      <p:sp>
+        <p:nvSpPr>
+          <p:cNvPr id="9" name="Content Placeholder 2">
+            <a:extLst>
+              <a:ext uri="{FF2B5EF4-FFF2-40B4-BE49-F238E27FC236}">
+                <a16:creationId xmlns:a16="http://schemas.microsoft.com/office/drawing/2014/main" id="{91B1BBF6-3BC0-49D0-811D-B0E3E97BA898}"/>
+              </a:ext>
+            </a:extLst>
+          </p:cNvPr>
+          <p:cNvSpPr>
+            <a:spLocks noGrp="1"/>
+          </p:cNvSpPr>
+          <p:nvPr>
+            <p:ph sz="half" idx="1"/>
+          </p:nvPr>
+        </p:nvSpPr>
+        <p:spPr>
+          <a:xfrm>
+            <a:off x="1300817" y="3273417"/>
+            <a:ext cx="9018599" cy="2773838"/>
+          </a:xfrm>
+        </p:spPr>
+        <p:txBody>
+          <a:bodyPr>
+            <a:normAutofit/>
+          </a:bodyPr>
+          <a:lstStyle/>
+          <a:p>
+            <a:r>
+              <a:rPr lang="en-US" dirty="0">
+                <a:solidFill>
+                  <a:srgbClr val="5A504A"/>
+                </a:solidFill>
+              </a:rPr>
+              <a:t>SCP is the name of the command we will be using</a:t>
+            </a:r>
+          </a:p>
+          <a:p>
+            <a:r>
+              <a:rPr lang="en-US" dirty="0">
+                <a:solidFill>
+                  <a:srgbClr val="5A504A"/>
+                </a:solidFill>
+              </a:rPr>
+              <a:t>The file to copy is the first parameter</a:t>
+            </a:r>
+          </a:p>
+          <a:p>
+            <a:r>
+              <a:rPr lang="en-US" dirty="0">
+                <a:solidFill>
+                  <a:srgbClr val="5A504A"/>
+                </a:solidFill>
+              </a:rPr>
+              <a:t>The second parameter follows the format:</a:t>
+            </a:r>
+          </a:p>
+          <a:p>
+            <a:pPr lvl="1"/>
+            <a:r>
+              <a:rPr lang="en-US" dirty="0">
+                <a:solidFill>
+                  <a:srgbClr val="5A504A"/>
+                </a:solidFill>
+              </a:rPr>
+              <a:t>&lt;hostname&gt;:&lt;</a:t>
+            </a:r>
+            <a:r>
+              <a:rPr lang="en-US" dirty="0" err="1">
+                <a:solidFill>
+                  <a:srgbClr val="5A504A"/>
+                </a:solidFill>
+              </a:rPr>
+              <a:t>dir</a:t>
+            </a:r>
+            <a:r>
+              <a:rPr lang="en-US" dirty="0">
+                <a:solidFill>
+                  <a:srgbClr val="5A504A"/>
+                </a:solidFill>
+              </a:rPr>
+              <a:t>&gt;</a:t>
+            </a:r>
+          </a:p>
+          <a:p>
+            <a:pPr lvl="2"/>
+            <a:r>
+              <a:rPr lang="en-US" dirty="0">
+                <a:solidFill>
+                  <a:srgbClr val="5A504A"/>
+                </a:solidFill>
+              </a:rPr>
+              <a:t>&lt;</a:t>
+            </a:r>
+            <a:r>
+              <a:rPr lang="en-US" dirty="0" err="1">
+                <a:solidFill>
+                  <a:srgbClr val="5A504A"/>
+                </a:solidFill>
+              </a:rPr>
+              <a:t>dir</a:t>
+            </a:r>
+            <a:r>
+              <a:rPr lang="en-US" dirty="0">
+                <a:solidFill>
+                  <a:srgbClr val="5A504A"/>
+                </a:solidFill>
+              </a:rPr>
+              <a:t>&gt; most often starts with ‘~’</a:t>
+            </a:r>
+          </a:p>
+          <a:p>
+            <a:pPr lvl="2"/>
+            <a:r>
+              <a:rPr lang="en-US" dirty="0">
+                <a:solidFill>
+                  <a:srgbClr val="5A504A"/>
+                </a:solidFill>
+              </a:rPr>
+              <a:t>This indicated your account’s home directory</a:t>
+            </a:r>
+          </a:p>
+          <a:p>
+            <a:pPr lvl="1"/>
+            <a:endParaRPr lang="en-US" dirty="0">
+              <a:solidFill>
+                <a:srgbClr val="5A504A"/>
+              </a:solidFill>
+            </a:endParaRPr>
+          </a:p>
+          <a:p>
+            <a:endParaRPr lang="en-US" dirty="0">
+              <a:solidFill>
+                <a:srgbClr val="5A504A"/>
+              </a:solidFill>
+            </a:endParaRPr>
+          </a:p>
+          <a:p>
+            <a:endParaRPr lang="en-US" dirty="0">
+              <a:solidFill>
+                <a:srgbClr val="5A504A"/>
+              </a:solidFill>
+            </a:endParaRPr>
+          </a:p>
+          <a:p>
+            <a:endParaRPr lang="en-US" dirty="0">
+              <a:solidFill>
+                <a:srgbClr val="5A504A"/>
+              </a:solidFill>
+            </a:endParaRPr>
+          </a:p>
+        </p:txBody>
+      </p:sp>
+      <p:pic>
+        <p:nvPicPr>
+          <p:cNvPr id="7" name="Picture 6">
+            <a:extLst>
+              <a:ext uri="{FF2B5EF4-FFF2-40B4-BE49-F238E27FC236}">
+                <a16:creationId xmlns:a16="http://schemas.microsoft.com/office/drawing/2014/main" id="{DAE5D334-0219-4205-8DB8-C38E656702D7}"/>
+              </a:ext>
+            </a:extLst>
+          </p:cNvPr>
+          <p:cNvPicPr>
+            <a:picLocks noChangeAspect="1"/>
+          </p:cNvPicPr>
+          <p:nvPr/>
+        </p:nvPicPr>
+        <p:blipFill>
+          <a:blip r:embed="rId2">
+            <a:extLst>
+              <a:ext uri="{28A0092B-C50C-407E-A947-70E740481C1C}">
+                <a14:useLocalDpi xmlns:a14="http://schemas.microsoft.com/office/drawing/2010/main" val="0"/>
+              </a:ext>
+            </a:extLst>
+          </a:blip>
+          <a:stretch>
+            <a:fillRect/>
+          </a:stretch>
+        </p:blipFill>
+        <p:spPr>
+          <a:xfrm>
+            <a:off x="437859" y="2197174"/>
+            <a:ext cx="11316282" cy="391741"/>
+          </a:xfrm>
+          <a:prstGeom prst="rect">
+            <a:avLst/>
+          </a:prstGeom>
+        </p:spPr>
+      </p:pic>
+      <p:sp>
+        <p:nvSpPr>
+          <p:cNvPr id="11" name="Left Brace 10">
+            <a:extLst>
+              <a:ext uri="{FF2B5EF4-FFF2-40B4-BE49-F238E27FC236}">
+                <a16:creationId xmlns:a16="http://schemas.microsoft.com/office/drawing/2014/main" id="{C967BCAD-876E-4369-AB41-D56FF94BB056}"/>
+              </a:ext>
+            </a:extLst>
+          </p:cNvPr>
+          <p:cNvSpPr/>
+          <p:nvPr/>
+        </p:nvSpPr>
+        <p:spPr>
+          <a:xfrm rot="16200000">
+            <a:off x="5569870" y="1280676"/>
+            <a:ext cx="162611" cy="2272243"/>
+          </a:xfrm>
+          <a:prstGeom prst="leftBrace">
+            <a:avLst/>
+          </a:prstGeom>
+          <a:ln>
+            <a:solidFill>
+              <a:schemeClr val="bg2"/>
+            </a:solidFill>
+          </a:ln>
+        </p:spPr>
+        <p:style>
+          <a:lnRef idx="3">
+            <a:schemeClr val="accent1"/>
+          </a:lnRef>
+          <a:fillRef idx="0">
+            <a:schemeClr val="accent1"/>
+          </a:fillRef>
+          <a:effectRef idx="2">
+            <a:schemeClr val="accent1"/>
+          </a:effectRef>
+          <a:fontRef idx="minor">
+            <a:schemeClr val="tx1"/>
+          </a:fontRef>
+        </p:style>
+        <p:txBody>
+          <a:bodyPr rtlCol="0" anchor="ctr"/>
+          <a:lstStyle/>
+          <a:p>
+            <a:pPr algn="ctr"/>
+            <a:endParaRPr lang="en-US"/>
+          </a:p>
+        </p:txBody>
+      </p:sp>
+      <p:sp>
+        <p:nvSpPr>
+          <p:cNvPr id="13" name="Left Brace 12">
+            <a:extLst>
+              <a:ext uri="{FF2B5EF4-FFF2-40B4-BE49-F238E27FC236}">
+                <a16:creationId xmlns:a16="http://schemas.microsoft.com/office/drawing/2014/main" id="{C22DB643-060B-47CD-BBDD-81A634417B67}"/>
+              </a:ext>
+            </a:extLst>
+          </p:cNvPr>
+          <p:cNvSpPr/>
+          <p:nvPr/>
+        </p:nvSpPr>
+        <p:spPr>
+          <a:xfrm rot="16200000" flipH="1">
+            <a:off x="7029811" y="1855223"/>
+            <a:ext cx="146576" cy="537331"/>
+          </a:xfrm>
+          <a:prstGeom prst="leftBrace">
+            <a:avLst/>
+          </a:prstGeom>
+        </p:spPr>
+        <p:style>
+          <a:lnRef idx="3">
+            <a:schemeClr val="accent1"/>
+          </a:lnRef>
+          <a:fillRef idx="0">
+            <a:schemeClr val="accent1"/>
+          </a:fillRef>
+          <a:effectRef idx="2">
+            <a:schemeClr val="accent1"/>
+          </a:effectRef>
+          <a:fontRef idx="minor">
+            <a:schemeClr val="tx1"/>
+          </a:fontRef>
+        </p:style>
+        <p:txBody>
+          <a:bodyPr rtlCol="0" anchor="ctr"/>
+          <a:lstStyle/>
+          <a:p>
+            <a:pPr algn="ctr"/>
+            <a:endParaRPr lang="en-US" dirty="0"/>
+          </a:p>
+        </p:txBody>
+      </p:sp>
+      <p:sp>
+        <p:nvSpPr>
+          <p:cNvPr id="14" name="TextBox 13">
+            <a:extLst>
+              <a:ext uri="{FF2B5EF4-FFF2-40B4-BE49-F238E27FC236}">
+                <a16:creationId xmlns:a16="http://schemas.microsoft.com/office/drawing/2014/main" id="{119C23F4-02BE-4D1E-B33B-CCC22915991F}"/>
+              </a:ext>
+            </a:extLst>
+          </p:cNvPr>
+          <p:cNvSpPr txBox="1"/>
+          <p:nvPr/>
+        </p:nvSpPr>
+        <p:spPr>
+          <a:xfrm>
+            <a:off x="5810117" y="1616058"/>
+            <a:ext cx="2585964" cy="369332"/>
+          </a:xfrm>
+          <a:prstGeom prst="rect">
+            <a:avLst/>
+          </a:prstGeom>
+          <a:noFill/>
+        </p:spPr>
+        <p:txBody>
+          <a:bodyPr wrap="none" rtlCol="0">
+            <a:spAutoFit/>
+          </a:bodyPr>
+          <a:lstStyle/>
+          <a:p>
+            <a:r>
+              <a:rPr lang="en-US" dirty="0">
+                <a:solidFill>
+                  <a:schemeClr val="bg2">
+                    <a:lumMod val="50000"/>
+                  </a:schemeClr>
+                </a:solidFill>
+              </a:rPr>
+              <a:t>Directory to copy into</a:t>
+            </a:r>
+          </a:p>
+        </p:txBody>
+      </p:sp>
+      <p:sp>
+        <p:nvSpPr>
+          <p:cNvPr id="15" name="TextBox 14">
+            <a:extLst>
+              <a:ext uri="{FF2B5EF4-FFF2-40B4-BE49-F238E27FC236}">
+                <a16:creationId xmlns:a16="http://schemas.microsoft.com/office/drawing/2014/main" id="{D00B98DB-932A-478B-9E17-4C2433BE5E19}"/>
+              </a:ext>
+            </a:extLst>
+          </p:cNvPr>
+          <p:cNvSpPr txBox="1"/>
+          <p:nvPr/>
+        </p:nvSpPr>
+        <p:spPr>
+          <a:xfrm>
+            <a:off x="4571616" y="2597179"/>
+            <a:ext cx="2323072" cy="369332"/>
+          </a:xfrm>
+          <a:prstGeom prst="rect">
+            <a:avLst/>
+          </a:prstGeom>
+          <a:noFill/>
+        </p:spPr>
+        <p:txBody>
+          <a:bodyPr wrap="none" rtlCol="0">
+            <a:spAutoFit/>
+          </a:bodyPr>
+          <a:lstStyle/>
+          <a:p>
+            <a:r>
+              <a:rPr lang="en-US" dirty="0" err="1">
+                <a:solidFill>
+                  <a:schemeClr val="bg2">
+                    <a:lumMod val="50000"/>
+                  </a:schemeClr>
+                </a:solidFill>
+              </a:rPr>
+              <a:t>SEASnet</a:t>
+            </a:r>
+            <a:r>
+              <a:rPr lang="en-US" dirty="0">
+                <a:solidFill>
+                  <a:schemeClr val="bg2">
+                    <a:lumMod val="50000"/>
+                  </a:schemeClr>
+                </a:solidFill>
+              </a:rPr>
+              <a:t> Hostname</a:t>
+            </a:r>
+          </a:p>
+        </p:txBody>
+      </p:sp>
+      <p:sp>
+        <p:nvSpPr>
+          <p:cNvPr id="16" name="Left Brace 15">
+            <a:extLst>
+              <a:ext uri="{FF2B5EF4-FFF2-40B4-BE49-F238E27FC236}">
+                <a16:creationId xmlns:a16="http://schemas.microsoft.com/office/drawing/2014/main" id="{A9C592A9-393A-4A4F-ADA2-7E83F2370771}"/>
+              </a:ext>
+            </a:extLst>
+          </p:cNvPr>
+          <p:cNvSpPr/>
+          <p:nvPr/>
+        </p:nvSpPr>
+        <p:spPr>
+          <a:xfrm rot="16200000" flipH="1">
+            <a:off x="4018515" y="1700634"/>
+            <a:ext cx="165477" cy="827605"/>
+          </a:xfrm>
+          <a:prstGeom prst="leftBrace">
+            <a:avLst/>
+          </a:prstGeom>
+        </p:spPr>
+        <p:style>
+          <a:lnRef idx="3">
+            <a:schemeClr val="accent1"/>
+          </a:lnRef>
+          <a:fillRef idx="0">
+            <a:schemeClr val="accent1"/>
+          </a:fillRef>
+          <a:effectRef idx="2">
+            <a:schemeClr val="accent1"/>
+          </a:effectRef>
+          <a:fontRef idx="minor">
+            <a:schemeClr val="tx1"/>
+          </a:fontRef>
+        </p:style>
+        <p:txBody>
+          <a:bodyPr rtlCol="0" anchor="ctr"/>
+          <a:lstStyle/>
+          <a:p>
+            <a:pPr algn="ctr"/>
+            <a:endParaRPr lang="en-US" dirty="0"/>
+          </a:p>
+        </p:txBody>
+      </p:sp>
+      <p:sp>
+        <p:nvSpPr>
+          <p:cNvPr id="17" name="TextBox 16">
+            <a:extLst>
+              <a:ext uri="{FF2B5EF4-FFF2-40B4-BE49-F238E27FC236}">
+                <a16:creationId xmlns:a16="http://schemas.microsoft.com/office/drawing/2014/main" id="{AB401E6B-3D34-4ACE-9B80-7CBF6631F7B3}"/>
+              </a:ext>
+            </a:extLst>
+          </p:cNvPr>
+          <p:cNvSpPr txBox="1"/>
+          <p:nvPr/>
+        </p:nvSpPr>
+        <p:spPr>
+          <a:xfrm>
+            <a:off x="3375734" y="1634605"/>
+            <a:ext cx="1451038" cy="369332"/>
+          </a:xfrm>
+          <a:prstGeom prst="rect">
+            <a:avLst/>
+          </a:prstGeom>
+          <a:noFill/>
+        </p:spPr>
+        <p:txBody>
+          <a:bodyPr wrap="none" rtlCol="0">
+            <a:spAutoFit/>
+          </a:bodyPr>
+          <a:lstStyle/>
+          <a:p>
+            <a:r>
+              <a:rPr lang="en-US" dirty="0">
+                <a:solidFill>
+                  <a:schemeClr val="bg2">
+                    <a:lumMod val="50000"/>
+                  </a:schemeClr>
+                </a:solidFill>
+              </a:rPr>
+              <a:t>File to copy</a:t>
+            </a:r>
+          </a:p>
+        </p:txBody>
+      </p:sp>
+    </p:spTree>
+    <p:extLst>
+      <p:ext uri="{BB962C8B-B14F-4D97-AF65-F5344CB8AC3E}">
+        <p14:creationId xmlns:p14="http://schemas.microsoft.com/office/powerpoint/2010/main" val="1937962700"/>
+      </p:ext>
+    </p:extLst>
+  </p:cSld>
+  <p:clrMapOvr>
+    <a:masterClrMapping/>
+  </p:clrMapOvr>
+</p:sld>
+</file>
+
+<file path=ppt/slides/slide15.xml><?xml version="1.0" encoding="utf-8"?>
+<p:sld xmlns:a="http://schemas.openxmlformats.org/drawingml/2006/main" xmlns:r="http://schemas.openxmlformats.org/officeDocument/2006/relationships" xmlns:p="http://schemas.openxmlformats.org/presentationml/2006/main">
+  <p:cSld>
+    <p:spTree>
+      <p:nvGrpSpPr>
+        <p:cNvPr id="1" name=""/>
+        <p:cNvGrpSpPr/>
+        <p:nvPr/>
+      </p:nvGrpSpPr>
+      <p:grpSpPr>
+        <a:xfrm>
+          <a:off x="0" y="0"/>
+          <a:ext cx="0" cy="0"/>
+          <a:chOff x="0" y="0"/>
+          <a:chExt cx="0" cy="0"/>
+        </a:xfrm>
+      </p:grpSpPr>
+      <p:sp>
+        <p:nvSpPr>
+          <p:cNvPr id="2" name="Title 1">
+            <a:extLst>
+              <a:ext uri="{FF2B5EF4-FFF2-40B4-BE49-F238E27FC236}">
+                <a16:creationId xmlns:a16="http://schemas.microsoft.com/office/drawing/2014/main" id="{0DE1D5C6-A209-48F2-B95E-F4E7DCD2EFBB}"/>
+              </a:ext>
+            </a:extLst>
+          </p:cNvPr>
+          <p:cNvSpPr>
+            <a:spLocks noGrp="1"/>
+          </p:cNvSpPr>
+          <p:nvPr>
+            <p:ph type="title"/>
+          </p:nvPr>
+        </p:nvSpPr>
+        <p:spPr/>
+        <p:txBody>
+          <a:bodyPr/>
+          <a:lstStyle/>
+          <a:p>
+            <a:r>
+              <a:rPr lang="en-US" dirty="0"/>
+              <a:t>Getting Files on The Server: MacOS</a:t>
+            </a:r>
+          </a:p>
+        </p:txBody>
+      </p:sp>
+      <p:sp>
+        <p:nvSpPr>
+          <p:cNvPr id="9" name="Content Placeholder 2">
+            <a:extLst>
+              <a:ext uri="{FF2B5EF4-FFF2-40B4-BE49-F238E27FC236}">
+                <a16:creationId xmlns:a16="http://schemas.microsoft.com/office/drawing/2014/main" id="{91B1BBF6-3BC0-49D0-811D-B0E3E97BA898}"/>
+              </a:ext>
+            </a:extLst>
+          </p:cNvPr>
+          <p:cNvSpPr>
+            <a:spLocks noGrp="1"/>
+          </p:cNvSpPr>
+          <p:nvPr>
+            <p:ph sz="half" idx="1"/>
+          </p:nvPr>
+        </p:nvSpPr>
+        <p:spPr>
+          <a:xfrm>
+            <a:off x="1940277" y="4140532"/>
+            <a:ext cx="8311444" cy="558829"/>
+          </a:xfrm>
+        </p:spPr>
+        <p:txBody>
+          <a:bodyPr>
+            <a:normAutofit/>
+          </a:bodyPr>
+          <a:lstStyle/>
+          <a:p>
+            <a:pPr marL="0" indent="0">
+              <a:buNone/>
+            </a:pPr>
+            <a:r>
+              <a:rPr lang="en-US" dirty="0">
+                <a:solidFill>
+                  <a:srgbClr val="5A504A"/>
+                </a:solidFill>
+              </a:rPr>
+              <a:t>And now we have the file on the Linux server </a:t>
+            </a:r>
+            <a:r>
+              <a:rPr lang="en-US" dirty="0">
+                <a:solidFill>
+                  <a:srgbClr val="5A504A"/>
+                </a:solidFill>
+                <a:sym typeface="Wingdings" panose="05000000000000000000" pitchFamily="2" charset="2"/>
+              </a:rPr>
+              <a:t></a:t>
+            </a:r>
+            <a:endParaRPr lang="en-US" dirty="0">
+              <a:solidFill>
+                <a:srgbClr val="5A504A"/>
+              </a:solidFill>
+            </a:endParaRPr>
+          </a:p>
+          <a:p>
+            <a:pPr lvl="1"/>
+            <a:endParaRPr lang="en-US" dirty="0">
+              <a:solidFill>
+                <a:srgbClr val="5A504A"/>
+              </a:solidFill>
+            </a:endParaRPr>
+          </a:p>
+          <a:p>
+            <a:endParaRPr lang="en-US" dirty="0">
+              <a:solidFill>
+                <a:srgbClr val="5A504A"/>
+              </a:solidFill>
+            </a:endParaRPr>
+          </a:p>
+          <a:p>
+            <a:endParaRPr lang="en-US" dirty="0">
+              <a:solidFill>
+                <a:srgbClr val="5A504A"/>
+              </a:solidFill>
+            </a:endParaRPr>
+          </a:p>
+          <a:p>
+            <a:endParaRPr lang="en-US" dirty="0">
+              <a:solidFill>
+                <a:srgbClr val="5A504A"/>
+              </a:solidFill>
+            </a:endParaRPr>
+          </a:p>
+        </p:txBody>
+      </p:sp>
+      <p:pic>
+        <p:nvPicPr>
+          <p:cNvPr id="4" name="Picture 3">
+            <a:extLst>
+              <a:ext uri="{FF2B5EF4-FFF2-40B4-BE49-F238E27FC236}">
+                <a16:creationId xmlns:a16="http://schemas.microsoft.com/office/drawing/2014/main" id="{635AF15F-B08A-47F3-A096-C44804AD8711}"/>
+              </a:ext>
+            </a:extLst>
+          </p:cNvPr>
+          <p:cNvPicPr>
+            <a:picLocks noChangeAspect="1"/>
+          </p:cNvPicPr>
+          <p:nvPr/>
+        </p:nvPicPr>
+        <p:blipFill>
+          <a:blip r:embed="rId2">
+            <a:extLst>
+              <a:ext uri="{28A0092B-C50C-407E-A947-70E740481C1C}">
+                <a14:useLocalDpi xmlns:a14="http://schemas.microsoft.com/office/drawing/2010/main" val="0"/>
+              </a:ext>
+            </a:extLst>
+          </a:blip>
+          <a:stretch>
+            <a:fillRect/>
+          </a:stretch>
+        </p:blipFill>
+        <p:spPr>
+          <a:xfrm>
+            <a:off x="247348" y="2717468"/>
+            <a:ext cx="11697301" cy="558829"/>
+          </a:xfrm>
+          <a:prstGeom prst="rect">
+            <a:avLst/>
+          </a:prstGeom>
+        </p:spPr>
+      </p:pic>
+    </p:spTree>
+    <p:extLst>
+      <p:ext uri="{BB962C8B-B14F-4D97-AF65-F5344CB8AC3E}">
+        <p14:creationId xmlns:p14="http://schemas.microsoft.com/office/powerpoint/2010/main" val="3665465895"/>
+      </p:ext>
+    </p:extLst>
+  </p:cSld>
+  <p:clrMapOvr>
+    <a:masterClrMapping/>
+  </p:clrMapOvr>
+</p:sld>
+</file>
+
+<file path=ppt/slides/slide16.xml><?xml version="1.0" encoding="utf-8"?>
+<p:sld xmlns:a="http://schemas.openxmlformats.org/drawingml/2006/main" xmlns:r="http://schemas.openxmlformats.org/officeDocument/2006/relationships" xmlns:p="http://schemas.openxmlformats.org/presentationml/2006/main">
+  <p:cSld>
+    <p:spTree>
+      <p:nvGrpSpPr>
+        <p:cNvPr id="1" name=""/>
+        <p:cNvGrpSpPr/>
+        <p:nvPr/>
+      </p:nvGrpSpPr>
+      <p:grpSpPr>
+        <a:xfrm>
+          <a:off x="0" y="0"/>
+          <a:ext cx="0" cy="0"/>
+          <a:chOff x="0" y="0"/>
+          <a:chExt cx="0" cy="0"/>
+        </a:xfrm>
+      </p:grpSpPr>
+      <p:sp>
+        <p:nvSpPr>
+          <p:cNvPr id="2" name="Title 1">
+            <a:extLst>
+              <a:ext uri="{FF2B5EF4-FFF2-40B4-BE49-F238E27FC236}">
+                <a16:creationId xmlns:a16="http://schemas.microsoft.com/office/drawing/2014/main" id="{E23E2CF8-5305-4804-A685-3EBE2824A3AF}"/>
+              </a:ext>
+            </a:extLst>
+          </p:cNvPr>
+          <p:cNvSpPr>
+            <a:spLocks noGrp="1"/>
+          </p:cNvSpPr>
+          <p:nvPr>
+            <p:ph type="title"/>
+          </p:nvPr>
+        </p:nvSpPr>
+        <p:spPr/>
+        <p:txBody>
+          <a:bodyPr/>
+          <a:lstStyle/>
+          <a:p>
+            <a:r>
+              <a:rPr lang="en-US" dirty="0"/>
+              <a:t>Using the System</a:t>
+            </a:r>
+          </a:p>
+        </p:txBody>
+      </p:sp>
+      <p:sp>
+        <p:nvSpPr>
+          <p:cNvPr id="3" name="Content Placeholder 2">
+            <a:extLst>
+              <a:ext uri="{FF2B5EF4-FFF2-40B4-BE49-F238E27FC236}">
+                <a16:creationId xmlns:a16="http://schemas.microsoft.com/office/drawing/2014/main" id="{B33D92C7-AA3A-4337-9E11-44E3F280ABFF}"/>
+              </a:ext>
+            </a:extLst>
+          </p:cNvPr>
+          <p:cNvSpPr>
+            <a:spLocks noGrp="1"/>
+          </p:cNvSpPr>
+          <p:nvPr>
+            <p:ph idx="1"/>
+          </p:nvPr>
+        </p:nvSpPr>
+        <p:spPr>
+          <a:xfrm>
+            <a:off x="838200" y="1668318"/>
+            <a:ext cx="10515600" cy="4824557"/>
+          </a:xfrm>
+        </p:spPr>
+        <p:txBody>
+          <a:bodyPr>
+            <a:normAutofit/>
+          </a:bodyPr>
+          <a:lstStyle/>
+          <a:p>
+            <a:r>
+              <a:rPr lang="en-US" dirty="0"/>
+              <a:t>The servers run on a command line interface</a:t>
+            </a:r>
+          </a:p>
+          <a:p>
+            <a:pPr lvl="1"/>
+            <a:r>
+              <a:rPr lang="en-US" dirty="0"/>
+              <a:t>The system provides a set of commands to navigate and use the system</a:t>
+            </a:r>
+          </a:p>
+          <a:p>
+            <a:pPr lvl="1"/>
+            <a:r>
+              <a:rPr lang="en-US" dirty="0"/>
+              <a:t>The alternative is providing a graphical interface like Windows or MacOS</a:t>
+            </a:r>
+          </a:p>
+          <a:p>
+            <a:r>
+              <a:rPr lang="en-US" dirty="0"/>
+              <a:t>Navigating the file system:</a:t>
+            </a:r>
+          </a:p>
+          <a:p>
+            <a:pPr lvl="1"/>
+            <a:r>
+              <a:rPr lang="en-US" dirty="0"/>
+              <a:t>ls: Print the contents of the current directory</a:t>
+            </a:r>
+          </a:p>
+          <a:p>
+            <a:pPr lvl="1"/>
+            <a:r>
+              <a:rPr lang="en-US" dirty="0" err="1"/>
+              <a:t>mkdir</a:t>
+            </a:r>
+            <a:r>
+              <a:rPr lang="en-US" dirty="0"/>
+              <a:t> &lt;</a:t>
+            </a:r>
+            <a:r>
+              <a:rPr lang="en-US" dirty="0" err="1"/>
+              <a:t>dir</a:t>
+            </a:r>
+            <a:r>
+              <a:rPr lang="en-US" dirty="0"/>
+              <a:t>&gt;: Create a directory with the name “</a:t>
+            </a:r>
+            <a:r>
+              <a:rPr lang="en-US" dirty="0" err="1"/>
+              <a:t>dir</a:t>
+            </a:r>
+            <a:r>
+              <a:rPr lang="en-US" dirty="0"/>
+              <a:t>”</a:t>
+            </a:r>
+          </a:p>
+          <a:p>
+            <a:pPr lvl="1"/>
+            <a:r>
+              <a:rPr lang="en-US" dirty="0"/>
+              <a:t>cd &lt;</a:t>
+            </a:r>
+            <a:r>
+              <a:rPr lang="en-US" dirty="0" err="1"/>
+              <a:t>dir</a:t>
+            </a:r>
+            <a:r>
+              <a:rPr lang="en-US" dirty="0"/>
+              <a:t>&gt;: Go into the directory with the name “</a:t>
+            </a:r>
+            <a:r>
+              <a:rPr lang="en-US" dirty="0" err="1"/>
+              <a:t>dir</a:t>
+            </a:r>
+            <a:r>
+              <a:rPr lang="en-US" dirty="0"/>
+              <a:t>”</a:t>
+            </a:r>
+          </a:p>
+          <a:p>
+            <a:pPr lvl="1"/>
+            <a:r>
+              <a:rPr lang="en-US" dirty="0"/>
+              <a:t>emacs &lt;file&gt;: Modify or create a file with name “file”</a:t>
+            </a:r>
+          </a:p>
+          <a:p>
+            <a:pPr lvl="2"/>
+            <a:r>
+              <a:rPr lang="en-US" dirty="0"/>
+              <a:t>This is a text editor used to write files</a:t>
+            </a:r>
+          </a:p>
+          <a:p>
+            <a:pPr lvl="2"/>
+            <a:r>
+              <a:rPr lang="en-US" dirty="0"/>
+              <a:t>Has lots of integrated commands</a:t>
+            </a:r>
+          </a:p>
+        </p:txBody>
+      </p:sp>
+    </p:spTree>
+    <p:extLst>
+      <p:ext uri="{BB962C8B-B14F-4D97-AF65-F5344CB8AC3E}">
+        <p14:creationId xmlns:p14="http://schemas.microsoft.com/office/powerpoint/2010/main" val="234949034"/>
+      </p:ext>
+    </p:extLst>
+  </p:cSld>
+  <p:clrMapOvr>
+    <a:masterClrMapping/>
+  </p:clrMapOvr>
+</p:sld>
+</file>
+
+<file path=ppt/slides/slide17.xml><?xml version="1.0" encoding="utf-8"?>
+<p:sld xmlns:a="http://schemas.openxmlformats.org/drawingml/2006/main" xmlns:r="http://schemas.openxmlformats.org/officeDocument/2006/relationships" xmlns:p="http://schemas.openxmlformats.org/presentationml/2006/main">
+  <p:cSld>
+    <p:spTree>
+      <p:nvGrpSpPr>
+        <p:cNvPr id="1" name=""/>
+        <p:cNvGrpSpPr/>
+        <p:nvPr/>
+      </p:nvGrpSpPr>
+      <p:grpSpPr>
+        <a:xfrm>
+          <a:off x="0" y="0"/>
+          <a:ext cx="0" cy="0"/>
+          <a:chOff x="0" y="0"/>
+          <a:chExt cx="0" cy="0"/>
+        </a:xfrm>
+      </p:grpSpPr>
+      <p:sp>
+        <p:nvSpPr>
+          <p:cNvPr id="2" name="Title 1">
+            <a:extLst>
+              <a:ext uri="{FF2B5EF4-FFF2-40B4-BE49-F238E27FC236}">
                 <a16:creationId xmlns:a16="http://schemas.microsoft.com/office/drawing/2014/main" id="{E23E2CF8-5305-4804-A685-3EBE2824A3AF}"/>
               </a:ext>
             </a:extLst>
@@ -3498,32 +5058,59 @@
           <a:p>
             <a:r>
               <a:rPr lang="en-US" dirty="0"/>
+              <a:t>Run the following command while on the server</a:t>
+            </a:r>
+          </a:p>
+          <a:p>
+            <a:pPr marL="0" indent="0">
+              <a:buNone/>
+            </a:pPr>
+            <a:r>
+              <a:rPr lang="en-US" sz="1800" dirty="0">
+                <a:latin typeface="Consolas" panose="020B0609020204030204" pitchFamily="49" charset="0"/>
+              </a:rPr>
+              <a:t>  curl -s -L http://cs.ucla.edu/classes/fall18/cs31/Utilities/setupg31 | bash</a:t>
+            </a:r>
+          </a:p>
+          <a:p>
+            <a:r>
+              <a:rPr lang="en-US" dirty="0"/>
               <a:t>To compile code you use the following command</a:t>
             </a:r>
           </a:p>
           <a:p>
             <a:pPr lvl="1"/>
             <a:r>
-              <a:rPr lang="en-US" dirty="0"/>
+              <a:rPr lang="en-US" dirty="0">
+                <a:latin typeface="Consolas" panose="020B0609020204030204" pitchFamily="49" charset="0"/>
+              </a:rPr>
               <a:t>g++ -o &lt;name of executable&gt; &lt;name of </a:t>
             </a:r>
             <a:r>
-              <a:rPr lang="en-US" dirty="0" err="1"/>
+              <a:rPr lang="en-US" dirty="0" err="1">
+                <a:latin typeface="Consolas" panose="020B0609020204030204" pitchFamily="49" charset="0"/>
+              </a:rPr>
               <a:t>cpp</a:t>
             </a:r>
             <a:r>
-              <a:rPr lang="en-US" dirty="0"/>
+              <a:rPr lang="en-US" dirty="0">
+                <a:latin typeface="Consolas" panose="020B0609020204030204" pitchFamily="49" charset="0"/>
+              </a:rPr>
               <a:t> file&gt;</a:t>
             </a:r>
           </a:p>
           <a:p>
             <a:pPr lvl="2"/>
             <a:r>
-              <a:rPr lang="en-US" dirty="0" err="1"/>
+              <a:rPr lang="en-US" dirty="0" err="1">
+                <a:latin typeface="Consolas" panose="020B0609020204030204" pitchFamily="49" charset="0"/>
+              </a:rPr>
               <a:t>eg</a:t>
             </a:r>
             <a:r>
-              <a:rPr lang="en-US" dirty="0"/>
+              <a:rPr lang="en-US" dirty="0">
+                <a:latin typeface="Consolas" panose="020B0609020204030204" pitchFamily="49" charset="0"/>
+              </a:rPr>
               <a:t>: g++ -o test test.cpp</a:t>
             </a:r>
           </a:p>
@@ -3536,18 +5123,24 @@
           <a:p>
             <a:pPr lvl="1"/>
             <a:r>
-              <a:rPr lang="en-US" dirty="0"/>
+              <a:rPr lang="en-US" dirty="0">
+                <a:latin typeface="Consolas" panose="020B0609020204030204" pitchFamily="49" charset="0"/>
+              </a:rPr>
               <a:t>./&lt;name of executable&gt;</a:t>
             </a:r>
           </a:p>
           <a:p>
             <a:pPr lvl="2"/>
             <a:r>
-              <a:rPr lang="en-US" dirty="0" err="1"/>
+              <a:rPr lang="en-US" dirty="0" err="1">
+                <a:latin typeface="Consolas" panose="020B0609020204030204" pitchFamily="49" charset="0"/>
+              </a:rPr>
               <a:t>eg</a:t>
             </a:r>
             <a:r>
-              <a:rPr lang="en-US" dirty="0"/>
+              <a:rPr lang="en-US" dirty="0">
+                <a:latin typeface="Consolas" panose="020B0609020204030204" pitchFamily="49" charset="0"/>
+              </a:rPr>
               <a:t>: ./test</a:t>
             </a:r>
           </a:p>
@@ -3561,6 +5154,152 @@
     <p:extLst>
       <p:ext uri="{BB962C8B-B14F-4D97-AF65-F5344CB8AC3E}">
         <p14:creationId xmlns:p14="http://schemas.microsoft.com/office/powerpoint/2010/main" val="3682833038"/>
+      </p:ext>
+    </p:extLst>
+  </p:cSld>
+  <p:clrMapOvr>
+    <a:masterClrMapping/>
+  </p:clrMapOvr>
+</p:sld>
+</file>
+
+<file path=ppt/slides/slide18.xml><?xml version="1.0" encoding="utf-8"?>
+<p:sld xmlns:a="http://schemas.openxmlformats.org/drawingml/2006/main" xmlns:r="http://schemas.openxmlformats.org/officeDocument/2006/relationships" xmlns:p="http://schemas.openxmlformats.org/presentationml/2006/main">
+  <p:cSld>
+    <p:spTree>
+      <p:nvGrpSpPr>
+        <p:cNvPr id="1" name=""/>
+        <p:cNvGrpSpPr/>
+        <p:nvPr/>
+      </p:nvGrpSpPr>
+      <p:grpSpPr>
+        <a:xfrm>
+          <a:off x="0" y="0"/>
+          <a:ext cx="0" cy="0"/>
+          <a:chOff x="0" y="0"/>
+          <a:chExt cx="0" cy="0"/>
+        </a:xfrm>
+      </p:grpSpPr>
+      <p:sp>
+        <p:nvSpPr>
+          <p:cNvPr id="2" name="Title 1">
+            <a:extLst>
+              <a:ext uri="{FF2B5EF4-FFF2-40B4-BE49-F238E27FC236}">
+                <a16:creationId xmlns:a16="http://schemas.microsoft.com/office/drawing/2014/main" id="{BF818741-B3B5-472C-92D9-9F0149AE0735}"/>
+              </a:ext>
+            </a:extLst>
+          </p:cNvPr>
+          <p:cNvSpPr>
+            <a:spLocks noGrp="1"/>
+          </p:cNvSpPr>
+          <p:nvPr>
+            <p:ph type="title"/>
+          </p:nvPr>
+        </p:nvSpPr>
+        <p:spPr/>
+        <p:txBody>
+          <a:bodyPr/>
+          <a:lstStyle/>
+          <a:p>
+            <a:r>
+              <a:rPr lang="en-US" dirty="0"/>
+              <a:t>Software Links</a:t>
+            </a:r>
+          </a:p>
+        </p:txBody>
+      </p:sp>
+      <p:sp>
+        <p:nvSpPr>
+          <p:cNvPr id="3" name="Content Placeholder 2">
+            <a:extLst>
+              <a:ext uri="{FF2B5EF4-FFF2-40B4-BE49-F238E27FC236}">
+                <a16:creationId xmlns:a16="http://schemas.microsoft.com/office/drawing/2014/main" id="{40BD294B-ABBC-44F3-9802-A29259559302}"/>
+              </a:ext>
+            </a:extLst>
+          </p:cNvPr>
+          <p:cNvSpPr>
+            <a:spLocks noGrp="1"/>
+          </p:cNvSpPr>
+          <p:nvPr>
+            <p:ph idx="1"/>
+          </p:nvPr>
+        </p:nvSpPr>
+        <p:spPr/>
+        <p:txBody>
+          <a:bodyPr/>
+          <a:lstStyle/>
+          <a:p>
+            <a:r>
+              <a:rPr lang="en-US" dirty="0"/>
+              <a:t>Cisco AnyConnect</a:t>
+            </a:r>
+          </a:p>
+          <a:p>
+            <a:pPr lvl="1"/>
+            <a:r>
+              <a:rPr lang="en-US" dirty="0"/>
+              <a:t>Mac OS: </a:t>
+            </a:r>
+            <a:r>
+              <a:rPr lang="en-US" dirty="0">
+                <a:hlinkClick r:id="rId2"/>
+              </a:rPr>
+              <a:t>https://ftp.bol.ucla.edu/pub/bol/vpn/software/anyconnect-macos-4.6.00362.dmg</a:t>
+            </a:r>
+            <a:endParaRPr lang="en-US" dirty="0"/>
+          </a:p>
+          <a:p>
+            <a:pPr lvl="1"/>
+            <a:r>
+              <a:rPr lang="en-US" dirty="0"/>
+              <a:t>Windows: </a:t>
+            </a:r>
+            <a:r>
+              <a:rPr lang="en-US" dirty="0">
+                <a:hlinkClick r:id="rId3"/>
+              </a:rPr>
+              <a:t>https://ftp.bol.ucla.edu/pub/bol/vpn/software/anyconnect-win-4.6.00362.msi</a:t>
+            </a:r>
+            <a:endParaRPr lang="en-US" dirty="0"/>
+          </a:p>
+          <a:p>
+            <a:r>
+              <a:rPr lang="en-US" dirty="0"/>
+              <a:t>Putty:</a:t>
+            </a:r>
+          </a:p>
+          <a:p>
+            <a:pPr marL="0" indent="0">
+              <a:buNone/>
+            </a:pPr>
+            <a:r>
+              <a:rPr lang="en-US" sz="2400" dirty="0"/>
+              <a:t>   </a:t>
+            </a:r>
+            <a:r>
+              <a:rPr lang="en-US" sz="2400" dirty="0">
+                <a:hlinkClick r:id="rId4"/>
+              </a:rPr>
+              <a:t>https://www.chiark.greenend.org.uk/~sgtatham/putty/latest.html</a:t>
+            </a:r>
+            <a:endParaRPr lang="en-US" sz="2400" dirty="0"/>
+          </a:p>
+          <a:p>
+            <a:pPr marL="0" indent="0">
+              <a:buNone/>
+            </a:pPr>
+            <a:endParaRPr lang="en-US" sz="2400" dirty="0"/>
+          </a:p>
+          <a:p>
+            <a:pPr lvl="1"/>
+            <a:endParaRPr lang="en-US" dirty="0"/>
+          </a:p>
+        </p:txBody>
+      </p:sp>
+    </p:spTree>
+    <p:extLst>
+      <p:ext uri="{BB962C8B-B14F-4D97-AF65-F5344CB8AC3E}">
+        <p14:creationId xmlns:p14="http://schemas.microsoft.com/office/powerpoint/2010/main" val="660223106"/>
       </p:ext>
     </p:extLst>
   </p:cSld>
@@ -3661,6 +5400,35 @@
               </a:rPr>
               <a:t>Professors test student code using these servers</a:t>
             </a:r>
+            <a:endParaRPr lang="en-US" b="1" i="1" u="sng" dirty="0">
+              <a:solidFill>
+                <a:schemeClr val="accent1"/>
+              </a:solidFill>
+            </a:endParaRPr>
+          </a:p>
+          <a:p>
+            <a:pPr lvl="1"/>
+            <a:r>
+              <a:rPr lang="en-US" b="1" i="1" u="sng" dirty="0">
+                <a:solidFill>
+                  <a:schemeClr val="accent1"/>
+                </a:solidFill>
+              </a:rPr>
+              <a:t>Make sure to test your code before submitting</a:t>
+            </a:r>
+            <a:endParaRPr lang="en-US" dirty="0">
+              <a:solidFill>
+                <a:schemeClr val="accent1"/>
+              </a:solidFill>
+            </a:endParaRPr>
+          </a:p>
+          <a:p>
+            <a:pPr lvl="1"/>
+            <a:endParaRPr lang="en-US" b="1" i="1" u="sng" dirty="0">
+              <a:solidFill>
+                <a:schemeClr val="accent1"/>
+              </a:solidFill>
+            </a:endParaRPr>
           </a:p>
         </p:txBody>
       </p:sp>
@@ -3806,7 +5574,7 @@
                   <a:srgbClr val="5A504A"/>
                 </a:solidFill>
               </a:rPr>
-              <a:t>Used as VPN</a:t>
+              <a:t>Used to login to VPN</a:t>
             </a:r>
           </a:p>
           <a:p>
@@ -3900,41 +5668,28 @@
                   <a:srgbClr val="5A504A"/>
                 </a:solidFill>
               </a:rPr>
+              <a:t>Cisco AnyConnect</a:t>
+            </a:r>
+          </a:p>
+          <a:p>
+            <a:pPr lvl="1"/>
+            <a:r>
+              <a:rPr lang="en-US" dirty="0">
+                <a:solidFill>
+                  <a:srgbClr val="5A504A"/>
+                </a:solidFill>
+              </a:rPr>
+              <a:t>Used to login to VPN</a:t>
+            </a:r>
+          </a:p>
+          <a:p>
+            <a:r>
+              <a:rPr lang="en-US" dirty="0">
+                <a:solidFill>
+                  <a:srgbClr val="5A504A"/>
+                </a:solidFill>
+              </a:rPr>
               <a:t>Use the Terminal app to login to the server</a:t>
-            </a:r>
-          </a:p>
-          <a:p>
-            <a:r>
-              <a:rPr lang="en-US" dirty="0">
-                <a:solidFill>
-                  <a:srgbClr val="5A504A"/>
-                </a:solidFill>
-              </a:rPr>
-              <a:t>Optional download: </a:t>
-            </a:r>
-            <a:r>
-              <a:rPr lang="en-US" dirty="0" err="1">
-                <a:solidFill>
-                  <a:srgbClr val="5A504A"/>
-                </a:solidFill>
-              </a:rPr>
-              <a:t>Cyberduck</a:t>
-            </a:r>
-            <a:endParaRPr lang="en-US" dirty="0">
-              <a:solidFill>
-                <a:srgbClr val="5A504A"/>
-              </a:solidFill>
-            </a:endParaRPr>
-          </a:p>
-          <a:p>
-            <a:pPr lvl="1"/>
-            <a:r>
-              <a:rPr lang="en-US" dirty="0">
-                <a:solidFill>
-                  <a:srgbClr val="5A504A"/>
-                </a:solidFill>
-              </a:rPr>
-              <a:t>Used to transfer files to/from the server</a:t>
             </a:r>
           </a:p>
         </p:txBody>
@@ -4031,6 +5786,660 @@
 </file>
 
 <file path=ppt/slides/slide4.xml><?xml version="1.0" encoding="utf-8"?>
+<p:sld xmlns:a="http://schemas.openxmlformats.org/drawingml/2006/main" xmlns:r="http://schemas.openxmlformats.org/officeDocument/2006/relationships" xmlns:p="http://schemas.openxmlformats.org/presentationml/2006/main">
+  <p:cSld>
+    <p:spTree>
+      <p:nvGrpSpPr>
+        <p:cNvPr id="1" name=""/>
+        <p:cNvGrpSpPr/>
+        <p:nvPr/>
+      </p:nvGrpSpPr>
+      <p:grpSpPr>
+        <a:xfrm>
+          <a:off x="0" y="0"/>
+          <a:ext cx="0" cy="0"/>
+          <a:chOff x="0" y="0"/>
+          <a:chExt cx="0" cy="0"/>
+        </a:xfrm>
+      </p:grpSpPr>
+      <p:sp>
+        <p:nvSpPr>
+          <p:cNvPr id="2" name="Title 1">
+            <a:extLst>
+              <a:ext uri="{FF2B5EF4-FFF2-40B4-BE49-F238E27FC236}">
+                <a16:creationId xmlns:a16="http://schemas.microsoft.com/office/drawing/2014/main" id="{E9ED5967-ACEF-4607-B478-BC82B32D0139}"/>
+              </a:ext>
+            </a:extLst>
+          </p:cNvPr>
+          <p:cNvSpPr>
+            <a:spLocks noGrp="1"/>
+          </p:cNvSpPr>
+          <p:nvPr>
+            <p:ph type="title"/>
+          </p:nvPr>
+        </p:nvSpPr>
+        <p:spPr/>
+        <p:txBody>
+          <a:bodyPr/>
+          <a:lstStyle/>
+          <a:p>
+            <a:r>
+              <a:rPr lang="en-US" dirty="0"/>
+              <a:t>Connecting to the VPN</a:t>
+            </a:r>
+          </a:p>
+        </p:txBody>
+      </p:sp>
+      <p:pic>
+        <p:nvPicPr>
+          <p:cNvPr id="5" name="Content Placeholder 4">
+            <a:extLst>
+              <a:ext uri="{FF2B5EF4-FFF2-40B4-BE49-F238E27FC236}">
+                <a16:creationId xmlns:a16="http://schemas.microsoft.com/office/drawing/2014/main" id="{FA08C9C5-8DFC-45CD-BC66-75783FBD23C5}"/>
+              </a:ext>
+            </a:extLst>
+          </p:cNvPr>
+          <p:cNvPicPr>
+            <a:picLocks noGrp="1" noChangeAspect="1"/>
+          </p:cNvPicPr>
+          <p:nvPr>
+            <p:ph idx="1"/>
+          </p:nvPr>
+        </p:nvPicPr>
+        <p:blipFill>
+          <a:blip r:embed="rId2">
+            <a:extLst>
+              <a:ext uri="{28A0092B-C50C-407E-A947-70E740481C1C}">
+                <a14:useLocalDpi xmlns:a14="http://schemas.microsoft.com/office/drawing/2010/main" val="0"/>
+              </a:ext>
+            </a:extLst>
+          </a:blip>
+          <a:stretch>
+            <a:fillRect/>
+          </a:stretch>
+        </p:blipFill>
+        <p:spPr>
+          <a:xfrm>
+            <a:off x="838200" y="2478961"/>
+            <a:ext cx="5699001" cy="2858461"/>
+          </a:xfrm>
+        </p:spPr>
+      </p:pic>
+      <p:sp>
+        <p:nvSpPr>
+          <p:cNvPr id="6" name="Content Placeholder 3">
+            <a:extLst>
+              <a:ext uri="{FF2B5EF4-FFF2-40B4-BE49-F238E27FC236}">
+                <a16:creationId xmlns:a16="http://schemas.microsoft.com/office/drawing/2014/main" id="{59E0E09B-EDC0-4623-8E1A-C19C8FC6213A}"/>
+              </a:ext>
+            </a:extLst>
+          </p:cNvPr>
+          <p:cNvSpPr txBox="1">
+            <a:spLocks/>
+          </p:cNvSpPr>
+          <p:nvPr/>
+        </p:nvSpPr>
+        <p:spPr>
+          <a:xfrm>
+            <a:off x="6848286" y="2085749"/>
+            <a:ext cx="4341330" cy="3644883"/>
+          </a:xfrm>
+          <a:prstGeom prst="rect">
+            <a:avLst/>
+          </a:prstGeom>
+        </p:spPr>
+        <p:txBody>
+          <a:bodyPr/>
+          <a:lstStyle>
+            <a:lvl1pPr marL="228600" indent="-228600" algn="l" defTabSz="914400" rtl="0" eaLnBrk="1" latinLnBrk="0" hangingPunct="1">
+              <a:lnSpc>
+                <a:spcPct val="90000"/>
+              </a:lnSpc>
+              <a:spcBef>
+                <a:spcPts val="1000"/>
+              </a:spcBef>
+              <a:buFont typeface="Arial" panose="020B0604020202020204" pitchFamily="34" charset="0"/>
+              <a:buChar char="•"/>
+              <a:defRPr sz="2800" kern="1200">
+                <a:solidFill>
+                  <a:schemeClr val="tx1"/>
+                </a:solidFill>
+                <a:latin typeface="+mn-lt"/>
+                <a:ea typeface="+mn-ea"/>
+                <a:cs typeface="+mn-cs"/>
+              </a:defRPr>
+            </a:lvl1pPr>
+            <a:lvl2pPr marL="685800" indent="-228600" algn="l" defTabSz="914400" rtl="0" eaLnBrk="1" latinLnBrk="0" hangingPunct="1">
+              <a:lnSpc>
+                <a:spcPct val="90000"/>
+              </a:lnSpc>
+              <a:spcBef>
+                <a:spcPts val="500"/>
+              </a:spcBef>
+              <a:buFont typeface="Arial" panose="020B0604020202020204" pitchFamily="34" charset="0"/>
+              <a:buChar char="•"/>
+              <a:defRPr sz="2400" kern="1200">
+                <a:solidFill>
+                  <a:schemeClr val="tx1"/>
+                </a:solidFill>
+                <a:latin typeface="+mn-lt"/>
+                <a:ea typeface="+mn-ea"/>
+                <a:cs typeface="+mn-cs"/>
+              </a:defRPr>
+            </a:lvl2pPr>
+            <a:lvl3pPr marL="1143000" indent="-228600" algn="l" defTabSz="914400" rtl="0" eaLnBrk="1" latinLnBrk="0" hangingPunct="1">
+              <a:lnSpc>
+                <a:spcPct val="90000"/>
+              </a:lnSpc>
+              <a:spcBef>
+                <a:spcPts val="500"/>
+              </a:spcBef>
+              <a:buFont typeface="Arial" panose="020B0604020202020204" pitchFamily="34" charset="0"/>
+              <a:buChar char="•"/>
+              <a:defRPr sz="2000" kern="1200">
+                <a:solidFill>
+                  <a:schemeClr val="tx1"/>
+                </a:solidFill>
+                <a:latin typeface="+mn-lt"/>
+                <a:ea typeface="+mn-ea"/>
+                <a:cs typeface="+mn-cs"/>
+              </a:defRPr>
+            </a:lvl3pPr>
+            <a:lvl4pPr marL="1600200" indent="-228600" algn="l" defTabSz="914400" rtl="0" eaLnBrk="1" latinLnBrk="0" hangingPunct="1">
+              <a:lnSpc>
+                <a:spcPct val="90000"/>
+              </a:lnSpc>
+              <a:spcBef>
+                <a:spcPts val="500"/>
+              </a:spcBef>
+              <a:buFont typeface="Arial" panose="020B0604020202020204" pitchFamily="34" charset="0"/>
+              <a:buChar char="•"/>
+              <a:defRPr sz="1800" kern="1200">
+                <a:solidFill>
+                  <a:schemeClr val="tx1"/>
+                </a:solidFill>
+                <a:latin typeface="+mn-lt"/>
+                <a:ea typeface="+mn-ea"/>
+                <a:cs typeface="+mn-cs"/>
+              </a:defRPr>
+            </a:lvl4pPr>
+            <a:lvl5pPr marL="2057400" indent="-228600" algn="l" defTabSz="914400" rtl="0" eaLnBrk="1" latinLnBrk="0" hangingPunct="1">
+              <a:lnSpc>
+                <a:spcPct val="90000"/>
+              </a:lnSpc>
+              <a:spcBef>
+                <a:spcPts val="500"/>
+              </a:spcBef>
+              <a:buFont typeface="Arial" panose="020B0604020202020204" pitchFamily="34" charset="0"/>
+              <a:buChar char="•"/>
+              <a:defRPr sz="1800" kern="1200">
+                <a:solidFill>
+                  <a:schemeClr val="tx1"/>
+                </a:solidFill>
+                <a:latin typeface="+mn-lt"/>
+                <a:ea typeface="+mn-ea"/>
+                <a:cs typeface="+mn-cs"/>
+              </a:defRPr>
+            </a:lvl5pPr>
+            <a:lvl6pPr marL="2514600" indent="-228600" algn="l" defTabSz="914400" rtl="0" eaLnBrk="1" latinLnBrk="0" hangingPunct="1">
+              <a:lnSpc>
+                <a:spcPct val="90000"/>
+              </a:lnSpc>
+              <a:spcBef>
+                <a:spcPts val="500"/>
+              </a:spcBef>
+              <a:buFont typeface="Arial" panose="020B0604020202020204" pitchFamily="34" charset="0"/>
+              <a:buChar char="•"/>
+              <a:defRPr sz="1800" kern="1200">
+                <a:solidFill>
+                  <a:schemeClr val="tx1"/>
+                </a:solidFill>
+                <a:latin typeface="+mn-lt"/>
+                <a:ea typeface="+mn-ea"/>
+                <a:cs typeface="+mn-cs"/>
+              </a:defRPr>
+            </a:lvl6pPr>
+            <a:lvl7pPr marL="2971800" indent="-228600" algn="l" defTabSz="914400" rtl="0" eaLnBrk="1" latinLnBrk="0" hangingPunct="1">
+              <a:lnSpc>
+                <a:spcPct val="90000"/>
+              </a:lnSpc>
+              <a:spcBef>
+                <a:spcPts val="500"/>
+              </a:spcBef>
+              <a:buFont typeface="Arial" panose="020B0604020202020204" pitchFamily="34" charset="0"/>
+              <a:buChar char="•"/>
+              <a:defRPr sz="1800" kern="1200">
+                <a:solidFill>
+                  <a:schemeClr val="tx1"/>
+                </a:solidFill>
+                <a:latin typeface="+mn-lt"/>
+                <a:ea typeface="+mn-ea"/>
+                <a:cs typeface="+mn-cs"/>
+              </a:defRPr>
+            </a:lvl7pPr>
+            <a:lvl8pPr marL="3429000" indent="-228600" algn="l" defTabSz="914400" rtl="0" eaLnBrk="1" latinLnBrk="0" hangingPunct="1">
+              <a:lnSpc>
+                <a:spcPct val="90000"/>
+              </a:lnSpc>
+              <a:spcBef>
+                <a:spcPts val="500"/>
+              </a:spcBef>
+              <a:buFont typeface="Arial" panose="020B0604020202020204" pitchFamily="34" charset="0"/>
+              <a:buChar char="•"/>
+              <a:defRPr sz="1800" kern="1200">
+                <a:solidFill>
+                  <a:schemeClr val="tx1"/>
+                </a:solidFill>
+                <a:latin typeface="+mn-lt"/>
+                <a:ea typeface="+mn-ea"/>
+                <a:cs typeface="+mn-cs"/>
+              </a:defRPr>
+            </a:lvl8pPr>
+            <a:lvl9pPr marL="3886200" indent="-228600" algn="l" defTabSz="914400" rtl="0" eaLnBrk="1" latinLnBrk="0" hangingPunct="1">
+              <a:lnSpc>
+                <a:spcPct val="90000"/>
+              </a:lnSpc>
+              <a:spcBef>
+                <a:spcPts val="500"/>
+              </a:spcBef>
+              <a:buFont typeface="Arial" panose="020B0604020202020204" pitchFamily="34" charset="0"/>
+              <a:buChar char="•"/>
+              <a:defRPr sz="1800" kern="1200">
+                <a:solidFill>
+                  <a:schemeClr val="tx1"/>
+                </a:solidFill>
+                <a:latin typeface="+mn-lt"/>
+                <a:ea typeface="+mn-ea"/>
+                <a:cs typeface="+mn-cs"/>
+              </a:defRPr>
+            </a:lvl9pPr>
+          </a:lstStyle>
+          <a:p>
+            <a:r>
+              <a:rPr lang="en-US" dirty="0">
+                <a:solidFill>
+                  <a:srgbClr val="5A504A"/>
+                </a:solidFill>
+              </a:rPr>
+              <a:t>Once installed, open the Cisco AnyConnect application</a:t>
+            </a:r>
+          </a:p>
+          <a:p>
+            <a:r>
+              <a:rPr lang="en-US" dirty="0">
+                <a:solidFill>
+                  <a:srgbClr val="5A504A"/>
+                </a:solidFill>
+              </a:rPr>
+              <a:t>The start screen should look like this</a:t>
+            </a:r>
+          </a:p>
+          <a:p>
+            <a:r>
+              <a:rPr lang="en-US" dirty="0">
+                <a:solidFill>
+                  <a:srgbClr val="5A504A"/>
+                </a:solidFill>
+              </a:rPr>
+              <a:t>Type ‘ssl.vpn.ucla.edu’ into the text box</a:t>
+            </a:r>
+          </a:p>
+          <a:p>
+            <a:r>
+              <a:rPr lang="en-US" dirty="0">
+                <a:solidFill>
+                  <a:srgbClr val="5A504A"/>
+                </a:solidFill>
+              </a:rPr>
+              <a:t>Press enter</a:t>
+            </a:r>
+          </a:p>
+        </p:txBody>
+      </p:sp>
+    </p:spTree>
+    <p:extLst>
+      <p:ext uri="{BB962C8B-B14F-4D97-AF65-F5344CB8AC3E}">
+        <p14:creationId xmlns:p14="http://schemas.microsoft.com/office/powerpoint/2010/main" val="4145686125"/>
+      </p:ext>
+    </p:extLst>
+  </p:cSld>
+  <p:clrMapOvr>
+    <a:masterClrMapping/>
+  </p:clrMapOvr>
+</p:sld>
+</file>
+
+<file path=ppt/slides/slide5.xml><?xml version="1.0" encoding="utf-8"?>
+<p:sld xmlns:a="http://schemas.openxmlformats.org/drawingml/2006/main" xmlns:r="http://schemas.openxmlformats.org/officeDocument/2006/relationships" xmlns:p="http://schemas.openxmlformats.org/presentationml/2006/main">
+  <p:cSld>
+    <p:spTree>
+      <p:nvGrpSpPr>
+        <p:cNvPr id="1" name=""/>
+        <p:cNvGrpSpPr/>
+        <p:nvPr/>
+      </p:nvGrpSpPr>
+      <p:grpSpPr>
+        <a:xfrm>
+          <a:off x="0" y="0"/>
+          <a:ext cx="0" cy="0"/>
+          <a:chOff x="0" y="0"/>
+          <a:chExt cx="0" cy="0"/>
+        </a:xfrm>
+      </p:grpSpPr>
+      <p:sp>
+        <p:nvSpPr>
+          <p:cNvPr id="2" name="Title 1">
+            <a:extLst>
+              <a:ext uri="{FF2B5EF4-FFF2-40B4-BE49-F238E27FC236}">
+                <a16:creationId xmlns:a16="http://schemas.microsoft.com/office/drawing/2014/main" id="{E9ED5967-ACEF-4607-B478-BC82B32D0139}"/>
+              </a:ext>
+            </a:extLst>
+          </p:cNvPr>
+          <p:cNvSpPr>
+            <a:spLocks noGrp="1"/>
+          </p:cNvSpPr>
+          <p:nvPr>
+            <p:ph type="title"/>
+          </p:nvPr>
+        </p:nvSpPr>
+        <p:spPr/>
+        <p:txBody>
+          <a:bodyPr/>
+          <a:lstStyle/>
+          <a:p>
+            <a:r>
+              <a:rPr lang="en-US" dirty="0"/>
+              <a:t>Connecting to the VPN</a:t>
+            </a:r>
+          </a:p>
+        </p:txBody>
+      </p:sp>
+      <p:pic>
+        <p:nvPicPr>
+          <p:cNvPr id="5" name="Content Placeholder 4">
+            <a:extLst>
+              <a:ext uri="{FF2B5EF4-FFF2-40B4-BE49-F238E27FC236}">
+                <a16:creationId xmlns:a16="http://schemas.microsoft.com/office/drawing/2014/main" id="{FA08C9C5-8DFC-45CD-BC66-75783FBD23C5}"/>
+              </a:ext>
+            </a:extLst>
+          </p:cNvPr>
+          <p:cNvPicPr>
+            <a:picLocks noGrp="1" noChangeAspect="1"/>
+          </p:cNvPicPr>
+          <p:nvPr>
+            <p:ph idx="1"/>
+          </p:nvPr>
+        </p:nvPicPr>
+        <p:blipFill>
+          <a:blip r:embed="rId2">
+            <a:extLst>
+              <a:ext uri="{28A0092B-C50C-407E-A947-70E740481C1C}">
+                <a14:useLocalDpi xmlns:a14="http://schemas.microsoft.com/office/drawing/2010/main" val="0"/>
+              </a:ext>
+            </a:extLst>
+          </a:blip>
+          <a:stretch>
+            <a:fillRect/>
+          </a:stretch>
+        </p:blipFill>
+        <p:spPr>
+          <a:xfrm>
+            <a:off x="1227990" y="2478961"/>
+            <a:ext cx="4919420" cy="2858461"/>
+          </a:xfrm>
+        </p:spPr>
+      </p:pic>
+      <p:sp>
+        <p:nvSpPr>
+          <p:cNvPr id="6" name="Content Placeholder 3">
+            <a:extLst>
+              <a:ext uri="{FF2B5EF4-FFF2-40B4-BE49-F238E27FC236}">
+                <a16:creationId xmlns:a16="http://schemas.microsoft.com/office/drawing/2014/main" id="{59E0E09B-EDC0-4623-8E1A-C19C8FC6213A}"/>
+              </a:ext>
+            </a:extLst>
+          </p:cNvPr>
+          <p:cNvSpPr txBox="1">
+            <a:spLocks/>
+          </p:cNvSpPr>
+          <p:nvPr/>
+        </p:nvSpPr>
+        <p:spPr>
+          <a:xfrm>
+            <a:off x="6848286" y="2085749"/>
+            <a:ext cx="4341330" cy="3966259"/>
+          </a:xfrm>
+          <a:prstGeom prst="rect">
+            <a:avLst/>
+          </a:prstGeom>
+        </p:spPr>
+        <p:txBody>
+          <a:bodyPr/>
+          <a:lstStyle>
+            <a:lvl1pPr marL="228600" indent="-228600" algn="l" defTabSz="914400" rtl="0" eaLnBrk="1" latinLnBrk="0" hangingPunct="1">
+              <a:lnSpc>
+                <a:spcPct val="90000"/>
+              </a:lnSpc>
+              <a:spcBef>
+                <a:spcPts val="1000"/>
+              </a:spcBef>
+              <a:buFont typeface="Arial" panose="020B0604020202020204" pitchFamily="34" charset="0"/>
+              <a:buChar char="•"/>
+              <a:defRPr sz="2800" kern="1200">
+                <a:solidFill>
+                  <a:schemeClr val="tx1"/>
+                </a:solidFill>
+                <a:latin typeface="+mn-lt"/>
+                <a:ea typeface="+mn-ea"/>
+                <a:cs typeface="+mn-cs"/>
+              </a:defRPr>
+            </a:lvl1pPr>
+            <a:lvl2pPr marL="685800" indent="-228600" algn="l" defTabSz="914400" rtl="0" eaLnBrk="1" latinLnBrk="0" hangingPunct="1">
+              <a:lnSpc>
+                <a:spcPct val="90000"/>
+              </a:lnSpc>
+              <a:spcBef>
+                <a:spcPts val="500"/>
+              </a:spcBef>
+              <a:buFont typeface="Arial" panose="020B0604020202020204" pitchFamily="34" charset="0"/>
+              <a:buChar char="•"/>
+              <a:defRPr sz="2400" kern="1200">
+                <a:solidFill>
+                  <a:schemeClr val="tx1"/>
+                </a:solidFill>
+                <a:latin typeface="+mn-lt"/>
+                <a:ea typeface="+mn-ea"/>
+                <a:cs typeface="+mn-cs"/>
+              </a:defRPr>
+            </a:lvl2pPr>
+            <a:lvl3pPr marL="1143000" indent="-228600" algn="l" defTabSz="914400" rtl="0" eaLnBrk="1" latinLnBrk="0" hangingPunct="1">
+              <a:lnSpc>
+                <a:spcPct val="90000"/>
+              </a:lnSpc>
+              <a:spcBef>
+                <a:spcPts val="500"/>
+              </a:spcBef>
+              <a:buFont typeface="Arial" panose="020B0604020202020204" pitchFamily="34" charset="0"/>
+              <a:buChar char="•"/>
+              <a:defRPr sz="2000" kern="1200">
+                <a:solidFill>
+                  <a:schemeClr val="tx1"/>
+                </a:solidFill>
+                <a:latin typeface="+mn-lt"/>
+                <a:ea typeface="+mn-ea"/>
+                <a:cs typeface="+mn-cs"/>
+              </a:defRPr>
+            </a:lvl3pPr>
+            <a:lvl4pPr marL="1600200" indent="-228600" algn="l" defTabSz="914400" rtl="0" eaLnBrk="1" latinLnBrk="0" hangingPunct="1">
+              <a:lnSpc>
+                <a:spcPct val="90000"/>
+              </a:lnSpc>
+              <a:spcBef>
+                <a:spcPts val="500"/>
+              </a:spcBef>
+              <a:buFont typeface="Arial" panose="020B0604020202020204" pitchFamily="34" charset="0"/>
+              <a:buChar char="•"/>
+              <a:defRPr sz="1800" kern="1200">
+                <a:solidFill>
+                  <a:schemeClr val="tx1"/>
+                </a:solidFill>
+                <a:latin typeface="+mn-lt"/>
+                <a:ea typeface="+mn-ea"/>
+                <a:cs typeface="+mn-cs"/>
+              </a:defRPr>
+            </a:lvl4pPr>
+            <a:lvl5pPr marL="2057400" indent="-228600" algn="l" defTabSz="914400" rtl="0" eaLnBrk="1" latinLnBrk="0" hangingPunct="1">
+              <a:lnSpc>
+                <a:spcPct val="90000"/>
+              </a:lnSpc>
+              <a:spcBef>
+                <a:spcPts val="500"/>
+              </a:spcBef>
+              <a:buFont typeface="Arial" panose="020B0604020202020204" pitchFamily="34" charset="0"/>
+              <a:buChar char="•"/>
+              <a:defRPr sz="1800" kern="1200">
+                <a:solidFill>
+                  <a:schemeClr val="tx1"/>
+                </a:solidFill>
+                <a:latin typeface="+mn-lt"/>
+                <a:ea typeface="+mn-ea"/>
+                <a:cs typeface="+mn-cs"/>
+              </a:defRPr>
+            </a:lvl5pPr>
+            <a:lvl6pPr marL="2514600" indent="-228600" algn="l" defTabSz="914400" rtl="0" eaLnBrk="1" latinLnBrk="0" hangingPunct="1">
+              <a:lnSpc>
+                <a:spcPct val="90000"/>
+              </a:lnSpc>
+              <a:spcBef>
+                <a:spcPts val="500"/>
+              </a:spcBef>
+              <a:buFont typeface="Arial" panose="020B0604020202020204" pitchFamily="34" charset="0"/>
+              <a:buChar char="•"/>
+              <a:defRPr sz="1800" kern="1200">
+                <a:solidFill>
+                  <a:schemeClr val="tx1"/>
+                </a:solidFill>
+                <a:latin typeface="+mn-lt"/>
+                <a:ea typeface="+mn-ea"/>
+                <a:cs typeface="+mn-cs"/>
+              </a:defRPr>
+            </a:lvl6pPr>
+            <a:lvl7pPr marL="2971800" indent="-228600" algn="l" defTabSz="914400" rtl="0" eaLnBrk="1" latinLnBrk="0" hangingPunct="1">
+              <a:lnSpc>
+                <a:spcPct val="90000"/>
+              </a:lnSpc>
+              <a:spcBef>
+                <a:spcPts val="500"/>
+              </a:spcBef>
+              <a:buFont typeface="Arial" panose="020B0604020202020204" pitchFamily="34" charset="0"/>
+              <a:buChar char="•"/>
+              <a:defRPr sz="1800" kern="1200">
+                <a:solidFill>
+                  <a:schemeClr val="tx1"/>
+                </a:solidFill>
+                <a:latin typeface="+mn-lt"/>
+                <a:ea typeface="+mn-ea"/>
+                <a:cs typeface="+mn-cs"/>
+              </a:defRPr>
+            </a:lvl7pPr>
+            <a:lvl8pPr marL="3429000" indent="-228600" algn="l" defTabSz="914400" rtl="0" eaLnBrk="1" latinLnBrk="0" hangingPunct="1">
+              <a:lnSpc>
+                <a:spcPct val="90000"/>
+              </a:lnSpc>
+              <a:spcBef>
+                <a:spcPts val="500"/>
+              </a:spcBef>
+              <a:buFont typeface="Arial" panose="020B0604020202020204" pitchFamily="34" charset="0"/>
+              <a:buChar char="•"/>
+              <a:defRPr sz="1800" kern="1200">
+                <a:solidFill>
+                  <a:schemeClr val="tx1"/>
+                </a:solidFill>
+                <a:latin typeface="+mn-lt"/>
+                <a:ea typeface="+mn-ea"/>
+                <a:cs typeface="+mn-cs"/>
+              </a:defRPr>
+            </a:lvl8pPr>
+            <a:lvl9pPr marL="3886200" indent="-228600" algn="l" defTabSz="914400" rtl="0" eaLnBrk="1" latinLnBrk="0" hangingPunct="1">
+              <a:lnSpc>
+                <a:spcPct val="90000"/>
+              </a:lnSpc>
+              <a:spcBef>
+                <a:spcPts val="500"/>
+              </a:spcBef>
+              <a:buFont typeface="Arial" panose="020B0604020202020204" pitchFamily="34" charset="0"/>
+              <a:buChar char="•"/>
+              <a:defRPr sz="1800" kern="1200">
+                <a:solidFill>
+                  <a:schemeClr val="tx1"/>
+                </a:solidFill>
+                <a:latin typeface="+mn-lt"/>
+                <a:ea typeface="+mn-ea"/>
+                <a:cs typeface="+mn-cs"/>
+              </a:defRPr>
+            </a:lvl9pPr>
+          </a:lstStyle>
+          <a:p>
+            <a:r>
+              <a:rPr lang="en-US" dirty="0">
+                <a:solidFill>
+                  <a:srgbClr val="5A504A"/>
+                </a:solidFill>
+              </a:rPr>
+              <a:t>Sign-in using </a:t>
+            </a:r>
+            <a:r>
+              <a:rPr lang="en-US" dirty="0" err="1">
+                <a:solidFill>
+                  <a:srgbClr val="5A504A"/>
+                </a:solidFill>
+              </a:rPr>
+              <a:t>myUCLA</a:t>
+            </a:r>
+            <a:r>
+              <a:rPr lang="en-US" dirty="0">
+                <a:solidFill>
+                  <a:srgbClr val="5A504A"/>
+                </a:solidFill>
+              </a:rPr>
+              <a:t> credentials</a:t>
+            </a:r>
+          </a:p>
+          <a:p>
+            <a:r>
+              <a:rPr lang="en-US" dirty="0">
+                <a:solidFill>
+                  <a:srgbClr val="5A504A"/>
+                </a:solidFill>
+              </a:rPr>
+              <a:t>This is going to send a multi-factor authentication alert so approve that</a:t>
+            </a:r>
+          </a:p>
+          <a:p>
+            <a:r>
+              <a:rPr lang="en-US" dirty="0">
+                <a:solidFill>
+                  <a:srgbClr val="5A504A"/>
+                </a:solidFill>
+              </a:rPr>
+              <a:t>Once you sign-in you should be connected to the VPN</a:t>
+            </a:r>
+          </a:p>
+        </p:txBody>
+      </p:sp>
+    </p:spTree>
+    <p:extLst>
+      <p:ext uri="{BB962C8B-B14F-4D97-AF65-F5344CB8AC3E}">
+        <p14:creationId xmlns:p14="http://schemas.microsoft.com/office/powerpoint/2010/main" val="3511766071"/>
+      </p:ext>
+    </p:extLst>
+  </p:cSld>
+  <p:clrMapOvr>
+    <a:masterClrMapping/>
+  </p:clrMapOvr>
+</p:sld>
+</file>
+
+<file path=ppt/slides/slide6.xml><?xml version="1.0" encoding="utf-8"?>
 <p:sld xmlns:a="http://schemas.openxmlformats.org/drawingml/2006/main" xmlns:r="http://schemas.openxmlformats.org/officeDocument/2006/relationships" xmlns:p="http://schemas.openxmlformats.org/presentationml/2006/main">
   <p:cSld>
     <p:spTree>
@@ -4379,332 +6788,6 @@
 </p:sld>
 </file>
 
-<file path=ppt/slides/slide5.xml><?xml version="1.0" encoding="utf-8"?>
-<p:sld xmlns:a="http://schemas.openxmlformats.org/drawingml/2006/main" xmlns:r="http://schemas.openxmlformats.org/officeDocument/2006/relationships" xmlns:p="http://schemas.openxmlformats.org/presentationml/2006/main">
-  <p:cSld>
-    <p:spTree>
-      <p:nvGrpSpPr>
-        <p:cNvPr id="1" name=""/>
-        <p:cNvGrpSpPr/>
-        <p:nvPr/>
-      </p:nvGrpSpPr>
-      <p:grpSpPr>
-        <a:xfrm>
-          <a:off x="0" y="0"/>
-          <a:ext cx="0" cy="0"/>
-          <a:chOff x="0" y="0"/>
-          <a:chExt cx="0" cy="0"/>
-        </a:xfrm>
-      </p:grpSpPr>
-      <p:sp>
-        <p:nvSpPr>
-          <p:cNvPr id="2" name="Title 1">
-            <a:extLst>
-              <a:ext uri="{FF2B5EF4-FFF2-40B4-BE49-F238E27FC236}">
-                <a16:creationId xmlns:a16="http://schemas.microsoft.com/office/drawing/2014/main" id="{0DE1D5C6-A209-48F2-B95E-F4E7DCD2EFBB}"/>
-              </a:ext>
-            </a:extLst>
-          </p:cNvPr>
-          <p:cNvSpPr>
-            <a:spLocks noGrp="1"/>
-          </p:cNvSpPr>
-          <p:nvPr>
-            <p:ph type="title"/>
-          </p:nvPr>
-        </p:nvSpPr>
-        <p:spPr/>
-        <p:txBody>
-          <a:bodyPr/>
-          <a:lstStyle/>
-          <a:p>
-            <a:r>
-              <a:rPr lang="en-US" dirty="0"/>
-              <a:t>Signing In: Windows</a:t>
-            </a:r>
-          </a:p>
-        </p:txBody>
-      </p:sp>
-      <p:pic>
-        <p:nvPicPr>
-          <p:cNvPr id="5" name="Picture 4">
-            <a:extLst>
-              <a:ext uri="{FF2B5EF4-FFF2-40B4-BE49-F238E27FC236}">
-                <a16:creationId xmlns:a16="http://schemas.microsoft.com/office/drawing/2014/main" id="{F2CF58C9-B860-4C96-86E3-D8BEB1A03CEF}"/>
-              </a:ext>
-            </a:extLst>
-          </p:cNvPr>
-          <p:cNvPicPr>
-            <a:picLocks noChangeAspect="1"/>
-          </p:cNvPicPr>
-          <p:nvPr/>
-        </p:nvPicPr>
-        <p:blipFill>
-          <a:blip r:embed="rId2">
-            <a:extLst>
-              <a:ext uri="{28A0092B-C50C-407E-A947-70E740481C1C}">
-                <a14:useLocalDpi xmlns:a14="http://schemas.microsoft.com/office/drawing/2010/main" val="0"/>
-              </a:ext>
-            </a:extLst>
-          </a:blip>
-          <a:stretch>
-            <a:fillRect/>
-          </a:stretch>
-        </p:blipFill>
-        <p:spPr>
-          <a:xfrm>
-            <a:off x="838200" y="1836144"/>
-            <a:ext cx="5817507" cy="3814998"/>
-          </a:xfrm>
-          <a:prstGeom prst="rect">
-            <a:avLst/>
-          </a:prstGeom>
-        </p:spPr>
-      </p:pic>
-      <p:sp>
-        <p:nvSpPr>
-          <p:cNvPr id="9" name="Content Placeholder 2">
-            <a:extLst>
-              <a:ext uri="{FF2B5EF4-FFF2-40B4-BE49-F238E27FC236}">
-                <a16:creationId xmlns:a16="http://schemas.microsoft.com/office/drawing/2014/main" id="{91B1BBF6-3BC0-49D0-811D-B0E3E97BA898}"/>
-              </a:ext>
-            </a:extLst>
-          </p:cNvPr>
-          <p:cNvSpPr>
-            <a:spLocks noGrp="1"/>
-          </p:cNvSpPr>
-          <p:nvPr>
-            <p:ph sz="half" idx="1"/>
-          </p:nvPr>
-        </p:nvSpPr>
-        <p:spPr>
-          <a:xfrm>
-            <a:off x="6847840" y="2365555"/>
-            <a:ext cx="5181600" cy="2756175"/>
-          </a:xfrm>
-        </p:spPr>
-        <p:txBody>
-          <a:bodyPr>
-            <a:normAutofit/>
-          </a:bodyPr>
-          <a:lstStyle/>
-          <a:p>
-            <a:r>
-              <a:rPr lang="en-US" dirty="0">
-                <a:solidFill>
-                  <a:srgbClr val="5A504A"/>
-                </a:solidFill>
-              </a:rPr>
-              <a:t>Type in your </a:t>
-            </a:r>
-            <a:r>
-              <a:rPr lang="en-US" dirty="0" err="1">
-                <a:solidFill>
-                  <a:srgbClr val="5A504A"/>
-                </a:solidFill>
-              </a:rPr>
-              <a:t>SEASnet</a:t>
-            </a:r>
-            <a:r>
-              <a:rPr lang="en-US" dirty="0">
-                <a:solidFill>
-                  <a:srgbClr val="5A504A"/>
-                </a:solidFill>
-              </a:rPr>
-              <a:t> password</a:t>
-            </a:r>
-          </a:p>
-          <a:p>
-            <a:r>
-              <a:rPr lang="en-US" dirty="0">
-                <a:solidFill>
-                  <a:srgbClr val="5A504A"/>
-                </a:solidFill>
-              </a:rPr>
-              <a:t>If no characters appear, don’t worry, that is normal</a:t>
-            </a:r>
-          </a:p>
-          <a:p>
-            <a:r>
-              <a:rPr lang="en-US" dirty="0">
-                <a:solidFill>
-                  <a:srgbClr val="5A504A"/>
-                </a:solidFill>
-              </a:rPr>
-              <a:t>Hit enter when you are done</a:t>
-            </a:r>
-          </a:p>
-          <a:p>
-            <a:endParaRPr lang="en-US" dirty="0">
-              <a:solidFill>
-                <a:srgbClr val="5A504A"/>
-              </a:solidFill>
-            </a:endParaRPr>
-          </a:p>
-          <a:p>
-            <a:endParaRPr lang="en-US" dirty="0">
-              <a:solidFill>
-                <a:srgbClr val="5A504A"/>
-              </a:solidFill>
-            </a:endParaRPr>
-          </a:p>
-        </p:txBody>
-      </p:sp>
-    </p:spTree>
-    <p:extLst>
-      <p:ext uri="{BB962C8B-B14F-4D97-AF65-F5344CB8AC3E}">
-        <p14:creationId xmlns:p14="http://schemas.microsoft.com/office/powerpoint/2010/main" val="1466019334"/>
-      </p:ext>
-    </p:extLst>
-  </p:cSld>
-  <p:clrMapOvr>
-    <a:masterClrMapping/>
-  </p:clrMapOvr>
-</p:sld>
-</file>
-
-<file path=ppt/slides/slide6.xml><?xml version="1.0" encoding="utf-8"?>
-<p:sld xmlns:a="http://schemas.openxmlformats.org/drawingml/2006/main" xmlns:r="http://schemas.openxmlformats.org/officeDocument/2006/relationships" xmlns:p="http://schemas.openxmlformats.org/presentationml/2006/main">
-  <p:cSld>
-    <p:spTree>
-      <p:nvGrpSpPr>
-        <p:cNvPr id="1" name=""/>
-        <p:cNvGrpSpPr/>
-        <p:nvPr/>
-      </p:nvGrpSpPr>
-      <p:grpSpPr>
-        <a:xfrm>
-          <a:off x="0" y="0"/>
-          <a:ext cx="0" cy="0"/>
-          <a:chOff x="0" y="0"/>
-          <a:chExt cx="0" cy="0"/>
-        </a:xfrm>
-      </p:grpSpPr>
-      <p:sp>
-        <p:nvSpPr>
-          <p:cNvPr id="2" name="Title 1">
-            <a:extLst>
-              <a:ext uri="{FF2B5EF4-FFF2-40B4-BE49-F238E27FC236}">
-                <a16:creationId xmlns:a16="http://schemas.microsoft.com/office/drawing/2014/main" id="{0DE1D5C6-A209-48F2-B95E-F4E7DCD2EFBB}"/>
-              </a:ext>
-            </a:extLst>
-          </p:cNvPr>
-          <p:cNvSpPr>
-            <a:spLocks noGrp="1"/>
-          </p:cNvSpPr>
-          <p:nvPr>
-            <p:ph type="title"/>
-          </p:nvPr>
-        </p:nvSpPr>
-        <p:spPr/>
-        <p:txBody>
-          <a:bodyPr/>
-          <a:lstStyle/>
-          <a:p>
-            <a:r>
-              <a:rPr lang="en-US" dirty="0"/>
-              <a:t>Signing In: Windows</a:t>
-            </a:r>
-          </a:p>
-        </p:txBody>
-      </p:sp>
-      <p:pic>
-        <p:nvPicPr>
-          <p:cNvPr id="5" name="Picture 4">
-            <a:extLst>
-              <a:ext uri="{FF2B5EF4-FFF2-40B4-BE49-F238E27FC236}">
-                <a16:creationId xmlns:a16="http://schemas.microsoft.com/office/drawing/2014/main" id="{F2CF58C9-B860-4C96-86E3-D8BEB1A03CEF}"/>
-              </a:ext>
-            </a:extLst>
-          </p:cNvPr>
-          <p:cNvPicPr>
-            <a:picLocks noChangeAspect="1"/>
-          </p:cNvPicPr>
-          <p:nvPr/>
-        </p:nvPicPr>
-        <p:blipFill>
-          <a:blip r:embed="rId2">
-            <a:extLst>
-              <a:ext uri="{28A0092B-C50C-407E-A947-70E740481C1C}">
-                <a14:useLocalDpi xmlns:a14="http://schemas.microsoft.com/office/drawing/2010/main" val="0"/>
-              </a:ext>
-            </a:extLst>
-          </a:blip>
-          <a:stretch>
-            <a:fillRect/>
-          </a:stretch>
-        </p:blipFill>
-        <p:spPr>
-          <a:xfrm>
-            <a:off x="838200" y="1690688"/>
-            <a:ext cx="6428110" cy="3749729"/>
-          </a:xfrm>
-          <a:prstGeom prst="rect">
-            <a:avLst/>
-          </a:prstGeom>
-        </p:spPr>
-      </p:pic>
-      <p:sp>
-        <p:nvSpPr>
-          <p:cNvPr id="9" name="Content Placeholder 2">
-            <a:extLst>
-              <a:ext uri="{FF2B5EF4-FFF2-40B4-BE49-F238E27FC236}">
-                <a16:creationId xmlns:a16="http://schemas.microsoft.com/office/drawing/2014/main" id="{91B1BBF6-3BC0-49D0-811D-B0E3E97BA898}"/>
-              </a:ext>
-            </a:extLst>
-          </p:cNvPr>
-          <p:cNvSpPr>
-            <a:spLocks noGrp="1"/>
-          </p:cNvSpPr>
-          <p:nvPr>
-            <p:ph sz="half" idx="1"/>
-          </p:nvPr>
-        </p:nvSpPr>
-        <p:spPr>
-          <a:xfrm>
-            <a:off x="7591430" y="3095403"/>
-            <a:ext cx="4377050" cy="940298"/>
-          </a:xfrm>
-        </p:spPr>
-        <p:txBody>
-          <a:bodyPr>
-            <a:normAutofit/>
-          </a:bodyPr>
-          <a:lstStyle/>
-          <a:p>
-            <a:pPr marL="0" indent="0">
-              <a:buNone/>
-            </a:pPr>
-            <a:r>
-              <a:rPr lang="en-US" dirty="0">
-                <a:solidFill>
-                  <a:srgbClr val="5A504A"/>
-                </a:solidFill>
-              </a:rPr>
-              <a:t>If you see a page similar to this, you are done!</a:t>
-            </a:r>
-          </a:p>
-          <a:p>
-            <a:endParaRPr lang="en-US" dirty="0">
-              <a:solidFill>
-                <a:srgbClr val="5A504A"/>
-              </a:solidFill>
-            </a:endParaRPr>
-          </a:p>
-        </p:txBody>
-      </p:sp>
-    </p:spTree>
-    <p:extLst>
-      <p:ext uri="{BB962C8B-B14F-4D97-AF65-F5344CB8AC3E}">
-        <p14:creationId xmlns:p14="http://schemas.microsoft.com/office/powerpoint/2010/main" val="2310727742"/>
-      </p:ext>
-    </p:extLst>
-  </p:cSld>
-  <p:clrMapOvr>
-    <a:masterClrMapping/>
-  </p:clrMapOvr>
-</p:sld>
-</file>
-
 <file path=ppt/slides/slide7.xml><?xml version="1.0" encoding="utf-8"?>
 <p:sld xmlns:a="http://schemas.openxmlformats.org/drawingml/2006/main" xmlns:r="http://schemas.openxmlformats.org/officeDocument/2006/relationships" xmlns:p="http://schemas.openxmlformats.org/presentationml/2006/main">
   <p:cSld>
@@ -4727,7 +6810,7 @@
           <p:cNvPr id="2" name="Title 1">
             <a:extLst>
               <a:ext uri="{FF2B5EF4-FFF2-40B4-BE49-F238E27FC236}">
-                <a16:creationId xmlns:a16="http://schemas.microsoft.com/office/drawing/2014/main" id="{E23E2CF8-5305-4804-A685-3EBE2824A3AF}"/>
+                <a16:creationId xmlns:a16="http://schemas.microsoft.com/office/drawing/2014/main" id="{0DE1D5C6-A209-48F2-B95E-F4E7DCD2EFBB}"/>
               </a:ext>
             </a:extLst>
           </p:cNvPr>
@@ -4745,31 +6828,67 @@
           <a:p>
             <a:r>
               <a:rPr lang="en-US" dirty="0"/>
-              <a:t>Using the System</a:t>
-            </a:r>
-          </a:p>
-        </p:txBody>
-      </p:sp>
-      <p:sp>
-        <p:nvSpPr>
-          <p:cNvPr id="3" name="Content Placeholder 2">
-            <a:extLst>
-              <a:ext uri="{FF2B5EF4-FFF2-40B4-BE49-F238E27FC236}">
-                <a16:creationId xmlns:a16="http://schemas.microsoft.com/office/drawing/2014/main" id="{B33D92C7-AA3A-4337-9E11-44E3F280ABFF}"/>
-              </a:ext>
-            </a:extLst>
-          </p:cNvPr>
-          <p:cNvSpPr>
-            <a:spLocks noGrp="1"/>
-          </p:cNvSpPr>
-          <p:nvPr>
-            <p:ph idx="1"/>
-          </p:nvPr>
-        </p:nvSpPr>
+              <a:t>Signing In: Windows</a:t>
+            </a:r>
+          </a:p>
+        </p:txBody>
+      </p:sp>
+      <p:pic>
+        <p:nvPicPr>
+          <p:cNvPr id="5" name="Picture 4">
+            <a:extLst>
+              <a:ext uri="{FF2B5EF4-FFF2-40B4-BE49-F238E27FC236}">
+                <a16:creationId xmlns:a16="http://schemas.microsoft.com/office/drawing/2014/main" id="{F2CF58C9-B860-4C96-86E3-D8BEB1A03CEF}"/>
+              </a:ext>
+            </a:extLst>
+          </p:cNvPr>
+          <p:cNvPicPr>
+            <a:picLocks noChangeAspect="1"/>
+          </p:cNvPicPr>
+          <p:nvPr/>
+        </p:nvPicPr>
+        <p:blipFill>
+          <a:blip r:embed="rId2">
+            <a:extLst>
+              <a:ext uri="{28A0092B-C50C-407E-A947-70E740481C1C}">
+                <a14:useLocalDpi xmlns:a14="http://schemas.microsoft.com/office/drawing/2010/main" val="0"/>
+              </a:ext>
+            </a:extLst>
+          </a:blip>
+          <a:stretch>
+            <a:fillRect/>
+          </a:stretch>
+        </p:blipFill>
         <p:spPr>
           <a:xfrm>
-            <a:off x="838200" y="1825624"/>
-            <a:ext cx="10515600" cy="4824557"/>
+            <a:off x="838200" y="1836144"/>
+            <a:ext cx="5817507" cy="3814998"/>
+          </a:xfrm>
+          <a:prstGeom prst="rect">
+            <a:avLst/>
+          </a:prstGeom>
+        </p:spPr>
+      </p:pic>
+      <p:sp>
+        <p:nvSpPr>
+          <p:cNvPr id="9" name="Content Placeholder 2">
+            <a:extLst>
+              <a:ext uri="{FF2B5EF4-FFF2-40B4-BE49-F238E27FC236}">
+                <a16:creationId xmlns:a16="http://schemas.microsoft.com/office/drawing/2014/main" id="{91B1BBF6-3BC0-49D0-811D-B0E3E97BA898}"/>
+              </a:ext>
+            </a:extLst>
+          </p:cNvPr>
+          <p:cNvSpPr>
+            <a:spLocks noGrp="1"/>
+          </p:cNvSpPr>
+          <p:nvPr>
+            <p:ph sz="half" idx="1"/>
+          </p:nvPr>
+        </p:nvSpPr>
+        <p:spPr>
+          <a:xfrm>
+            <a:off x="6847840" y="2365555"/>
+            <a:ext cx="5181600" cy="2756175"/>
           </a:xfrm>
         </p:spPr>
         <p:txBody>
@@ -4779,114 +6898,70 @@
           <a:lstStyle/>
           <a:p>
             <a:r>
-              <a:rPr lang="en-US" dirty="0"/>
-              <a:t>The servers run on a command line interface</a:t>
-            </a:r>
-          </a:p>
-          <a:p>
-            <a:pPr lvl="1"/>
-            <a:r>
-              <a:rPr lang="en-US" dirty="0"/>
-              <a:t>The system provides a set of commands to navigate and use the system</a:t>
-            </a:r>
-          </a:p>
-          <a:p>
-            <a:pPr lvl="1"/>
-            <a:r>
-              <a:rPr lang="en-US" dirty="0"/>
-              <a:t>The alternative is providing a graphical interface like Windows or MacOS</a:t>
-            </a:r>
-          </a:p>
-          <a:p>
-            <a:r>
-              <a:rPr lang="en-US" dirty="0"/>
-              <a:t>Navigating the file system:</a:t>
-            </a:r>
-          </a:p>
-          <a:p>
-            <a:pPr lvl="1"/>
-            <a:r>
-              <a:rPr lang="en-US" dirty="0"/>
-              <a:t>ls: Print the current directory</a:t>
-            </a:r>
-          </a:p>
-          <a:p>
-            <a:pPr lvl="1"/>
-            <a:r>
-              <a:rPr lang="en-US" dirty="0" err="1"/>
-              <a:t>mkdir</a:t>
-            </a:r>
-            <a:r>
-              <a:rPr lang="en-US" dirty="0"/>
-              <a:t> &lt;</a:t>
-            </a:r>
-            <a:r>
-              <a:rPr lang="en-US" dirty="0" err="1"/>
-              <a:t>dir</a:t>
-            </a:r>
-            <a:r>
-              <a:rPr lang="en-US" dirty="0"/>
-              <a:t>&gt;: Create a directory with the name “</a:t>
-            </a:r>
-            <a:r>
-              <a:rPr lang="en-US" dirty="0" err="1"/>
-              <a:t>dir</a:t>
-            </a:r>
-            <a:r>
-              <a:rPr lang="en-US" dirty="0"/>
-              <a:t>”</a:t>
-            </a:r>
-          </a:p>
-          <a:p>
-            <a:pPr lvl="1"/>
-            <a:r>
-              <a:rPr lang="en-US" dirty="0"/>
-              <a:t>cd &lt;</a:t>
-            </a:r>
-            <a:r>
-              <a:rPr lang="en-US" dirty="0" err="1"/>
-              <a:t>dir</a:t>
-            </a:r>
-            <a:r>
-              <a:rPr lang="en-US" dirty="0"/>
-              <a:t>&gt;: Go into the directory with the name “</a:t>
-            </a:r>
-            <a:r>
-              <a:rPr lang="en-US" dirty="0" err="1"/>
-              <a:t>dir</a:t>
-            </a:r>
-            <a:r>
-              <a:rPr lang="en-US" dirty="0"/>
-              <a:t>”</a:t>
-            </a:r>
-          </a:p>
-          <a:p>
-            <a:pPr lvl="1"/>
-            <a:r>
-              <a:rPr lang="en-US" dirty="0"/>
-              <a:t>emacs &lt;file&gt;: Modify or create a file with name “file”</a:t>
-            </a:r>
-          </a:p>
-          <a:p>
-            <a:pPr lvl="2"/>
-            <a:r>
-              <a:rPr lang="en-US" dirty="0"/>
-              <a:t>This is a text editor used to write files</a:t>
-            </a:r>
-          </a:p>
-          <a:p>
-            <a:pPr lvl="2"/>
-            <a:r>
-              <a:rPr lang="en-US" dirty="0"/>
-              <a:t>Has lots of integrated commands</a:t>
-            </a:r>
+              <a:rPr lang="en-US" dirty="0">
+                <a:solidFill>
+                  <a:srgbClr val="5A504A"/>
+                </a:solidFill>
+              </a:rPr>
+              <a:t>Type in your </a:t>
+            </a:r>
+            <a:r>
+              <a:rPr lang="en-US" dirty="0" err="1">
+                <a:solidFill>
+                  <a:srgbClr val="5A504A"/>
+                </a:solidFill>
+              </a:rPr>
+              <a:t>SEASnet</a:t>
+            </a:r>
+            <a:r>
+              <a:rPr lang="en-US" dirty="0">
+                <a:solidFill>
+                  <a:srgbClr val="5A504A"/>
+                </a:solidFill>
+              </a:rPr>
+              <a:t> password</a:t>
+            </a:r>
+          </a:p>
+          <a:p>
+            <a:r>
+              <a:rPr lang="en-US" dirty="0">
+                <a:solidFill>
+                  <a:srgbClr val="5A504A"/>
+                </a:solidFill>
+              </a:rPr>
+              <a:t>If no characters appear, don’t worry, that is normal</a:t>
+            </a:r>
+          </a:p>
+          <a:p>
+            <a:r>
+              <a:rPr lang="en-US" dirty="0">
+                <a:solidFill>
+                  <a:srgbClr val="5A504A"/>
+                </a:solidFill>
+              </a:rPr>
+              <a:t>Hit enter when you are done</a:t>
+            </a:r>
+          </a:p>
+          <a:p>
+            <a:endParaRPr lang="en-US" dirty="0">
+              <a:solidFill>
+                <a:srgbClr val="5A504A"/>
+              </a:solidFill>
+            </a:endParaRPr>
+          </a:p>
+          <a:p>
+            <a:endParaRPr lang="en-US" dirty="0">
+              <a:solidFill>
+                <a:srgbClr val="5A504A"/>
+              </a:solidFill>
+            </a:endParaRPr>
           </a:p>
         </p:txBody>
       </p:sp>
     </p:spTree>
     <p:extLst>
       <p:ext uri="{BB962C8B-B14F-4D97-AF65-F5344CB8AC3E}">
-        <p14:creationId xmlns:p14="http://schemas.microsoft.com/office/powerpoint/2010/main" val="234949034"/>
+        <p14:creationId xmlns:p14="http://schemas.microsoft.com/office/powerpoint/2010/main" val="1466019334"/>
       </p:ext>
     </p:extLst>
   </p:cSld>
@@ -4918,7 +6993,7 @@
           <p:cNvPr id="2" name="Title 1">
             <a:extLst>
               <a:ext uri="{FF2B5EF4-FFF2-40B4-BE49-F238E27FC236}">
-                <a16:creationId xmlns:a16="http://schemas.microsoft.com/office/drawing/2014/main" id="{7B3A28E6-F6A0-4A13-AC8B-EFA8F774FDFD}"/>
+                <a16:creationId xmlns:a16="http://schemas.microsoft.com/office/drawing/2014/main" id="{0DE1D5C6-A209-48F2-B95E-F4E7DCD2EFBB}"/>
               </a:ext>
             </a:extLst>
           </p:cNvPr>
@@ -4929,39 +7004,31 @@
             <p:ph type="title"/>
           </p:nvPr>
         </p:nvSpPr>
-        <p:spPr>
-          <a:xfrm>
-            <a:off x="838200" y="365125"/>
-            <a:ext cx="10515600" cy="1325563"/>
-          </a:xfrm>
-        </p:spPr>
+        <p:spPr/>
         <p:txBody>
           <a:bodyPr/>
           <a:lstStyle/>
           <a:p>
             <a:r>
-              <a:rPr lang="en-US"/>
-              <a:t>Getting Files on the Server: Windows</a:t>
-            </a:r>
-            <a:endParaRPr lang="en-US" dirty="0"/>
+              <a:rPr lang="en-US" dirty="0"/>
+              <a:t>Signing In: Windows</a:t>
+            </a:r>
           </a:p>
         </p:txBody>
       </p:sp>
       <p:pic>
         <p:nvPicPr>
-          <p:cNvPr id="5" name="Content Placeholder 4">
-            <a:extLst>
-              <a:ext uri="{FF2B5EF4-FFF2-40B4-BE49-F238E27FC236}">
-                <a16:creationId xmlns:a16="http://schemas.microsoft.com/office/drawing/2014/main" id="{D1F9AB47-2B43-4750-8FBC-30D7F6BB438A}"/>
+          <p:cNvPr id="5" name="Picture 4">
+            <a:extLst>
+              <a:ext uri="{FF2B5EF4-FFF2-40B4-BE49-F238E27FC236}">
+                <a16:creationId xmlns:a16="http://schemas.microsoft.com/office/drawing/2014/main" id="{F2CF58C9-B860-4C96-86E3-D8BEB1A03CEF}"/>
               </a:ext>
             </a:extLst>
           </p:cNvPr>
           <p:cNvPicPr>
-            <a:picLocks noGrp="1" noChangeAspect="1"/>
+            <a:picLocks noChangeAspect="1"/>
           </p:cNvPicPr>
-          <p:nvPr>
-            <p:ph idx="1"/>
-          </p:nvPr>
+          <p:nvPr/>
         </p:nvPicPr>
         <p:blipFill>
           <a:blip r:embed="rId2">
@@ -4977,90 +7044,67 @@
         </p:blipFill>
         <p:spPr>
           <a:xfrm>
-            <a:off x="8041609" y="2295651"/>
-            <a:ext cx="3460928" cy="2806844"/>
-          </a:xfrm>
-        </p:spPr>
-      </p:pic>
-      <p:pic>
-        <p:nvPicPr>
-          <p:cNvPr id="7" name="Picture 6">
-            <a:extLst>
-              <a:ext uri="{FF2B5EF4-FFF2-40B4-BE49-F238E27FC236}">
-                <a16:creationId xmlns:a16="http://schemas.microsoft.com/office/drawing/2014/main" id="{2F2EEACF-4732-4126-A002-2C3B623BC915}"/>
-              </a:ext>
-            </a:extLst>
-          </p:cNvPr>
-          <p:cNvPicPr>
-            <a:picLocks noChangeAspect="1"/>
-          </p:cNvPicPr>
-          <p:nvPr/>
-        </p:nvPicPr>
-        <p:blipFill>
-          <a:blip r:embed="rId3">
-            <a:extLst>
-              <a:ext uri="{28A0092B-C50C-407E-A947-70E740481C1C}">
-                <a14:useLocalDpi xmlns:a14="http://schemas.microsoft.com/office/drawing/2010/main" val="0"/>
-              </a:ext>
-            </a:extLst>
-          </a:blip>
-          <a:stretch>
-            <a:fillRect/>
-          </a:stretch>
-        </p:blipFill>
-        <p:spPr>
-          <a:xfrm>
-            <a:off x="291569" y="1867004"/>
-            <a:ext cx="5886753" cy="3664138"/>
+            <a:off x="838200" y="1690688"/>
+            <a:ext cx="6428110" cy="3749729"/>
           </a:xfrm>
           <a:prstGeom prst="rect">
             <a:avLst/>
           </a:prstGeom>
         </p:spPr>
       </p:pic>
-      <p:cxnSp>
-        <p:nvCxnSpPr>
-          <p:cNvPr id="9" name="Straight Arrow Connector 8">
-            <a:extLst>
-              <a:ext uri="{FF2B5EF4-FFF2-40B4-BE49-F238E27FC236}">
-                <a16:creationId xmlns:a16="http://schemas.microsoft.com/office/drawing/2014/main" id="{0AB0067E-7786-4F42-91AE-E0ECE8DAAA85}"/>
-              </a:ext>
-            </a:extLst>
-          </p:cNvPr>
-          <p:cNvCxnSpPr/>
-          <p:nvPr/>
-        </p:nvCxnSpPr>
+      <p:sp>
+        <p:nvSpPr>
+          <p:cNvPr id="9" name="Content Placeholder 2">
+            <a:extLst>
+              <a:ext uri="{FF2B5EF4-FFF2-40B4-BE49-F238E27FC236}">
+                <a16:creationId xmlns:a16="http://schemas.microsoft.com/office/drawing/2014/main" id="{91B1BBF6-3BC0-49D0-811D-B0E3E97BA898}"/>
+              </a:ext>
+            </a:extLst>
+          </p:cNvPr>
+          <p:cNvSpPr>
+            <a:spLocks noGrp="1"/>
+          </p:cNvSpPr>
+          <p:nvPr>
+            <p:ph sz="half" idx="1"/>
+          </p:nvPr>
+        </p:nvSpPr>
         <p:spPr>
           <a:xfrm>
-            <a:off x="6373091" y="3699073"/>
-            <a:ext cx="1468582" cy="0"/>
+            <a:off x="7591430" y="3095403"/>
+            <a:ext cx="4377050" cy="940298"/>
           </a:xfrm>
-          <a:prstGeom prst="straightConnector1">
-            <a:avLst/>
-          </a:prstGeom>
-          <a:ln>
-            <a:tailEnd type="triangle"/>
-          </a:ln>
         </p:spPr>
-        <p:style>
-          <a:lnRef idx="3">
-            <a:schemeClr val="accent5"/>
-          </a:lnRef>
-          <a:fillRef idx="0">
-            <a:schemeClr val="accent5"/>
-          </a:fillRef>
-          <a:effectRef idx="2">
-            <a:schemeClr val="accent5"/>
-          </a:effectRef>
-          <a:fontRef idx="minor">
-            <a:schemeClr val="tx1"/>
-          </a:fontRef>
-        </p:style>
-      </p:cxnSp>
+        <p:txBody>
+          <a:bodyPr>
+            <a:normAutofit/>
+          </a:bodyPr>
+          <a:lstStyle/>
+          <a:p>
+            <a:pPr marL="0" indent="0">
+              <a:buNone/>
+            </a:pPr>
+            <a:r>
+              <a:rPr lang="en-US" dirty="0">
+                <a:solidFill>
+                  <a:srgbClr val="5A504A"/>
+                </a:solidFill>
+              </a:rPr>
+              <a:t>If you see a page similar to this, you are done!</a:t>
+            </a:r>
+          </a:p>
+          <a:p>
+            <a:endParaRPr lang="en-US" dirty="0">
+              <a:solidFill>
+                <a:srgbClr val="5A504A"/>
+              </a:solidFill>
+            </a:endParaRPr>
+          </a:p>
+        </p:txBody>
+      </p:sp>
     </p:spTree>
     <p:extLst>
       <p:ext uri="{BB962C8B-B14F-4D97-AF65-F5344CB8AC3E}">
-        <p14:creationId xmlns:p14="http://schemas.microsoft.com/office/powerpoint/2010/main" val="3984108541"/>
+        <p14:creationId xmlns:p14="http://schemas.microsoft.com/office/powerpoint/2010/main" val="2310727742"/>
       </p:ext>
     </p:extLst>
   </p:cSld>
@@ -5092,7 +7136,7 @@
           <p:cNvPr id="2" name="Title 1">
             <a:extLst>
               <a:ext uri="{FF2B5EF4-FFF2-40B4-BE49-F238E27FC236}">
-                <a16:creationId xmlns:a16="http://schemas.microsoft.com/office/drawing/2014/main" id="{7B3A28E6-F6A0-4A13-AC8B-EFA8F774FDFD}"/>
+                <a16:creationId xmlns:a16="http://schemas.microsoft.com/office/drawing/2014/main" id="{48445CB3-CD2B-4F7E-8BD9-502F464E0BF2}"/>
               </a:ext>
             </a:extLst>
           </p:cNvPr>
@@ -5102,31 +7146,205 @@
           <p:nvPr>
             <p:ph type="title"/>
           </p:nvPr>
+        </p:nvSpPr>
+        <p:spPr/>
+        <p:txBody>
+          <a:bodyPr/>
+          <a:lstStyle/>
+          <a:p>
+            <a:r>
+              <a:rPr lang="en-US" dirty="0"/>
+              <a:t>Signing In: MacOS</a:t>
+            </a:r>
+          </a:p>
+        </p:txBody>
+      </p:sp>
+      <p:sp>
+        <p:nvSpPr>
+          <p:cNvPr id="8" name="Left Brace 7">
+            <a:extLst>
+              <a:ext uri="{FF2B5EF4-FFF2-40B4-BE49-F238E27FC236}">
+                <a16:creationId xmlns:a16="http://schemas.microsoft.com/office/drawing/2014/main" id="{2A89783C-4C69-4F31-9E6E-78203DC2555D}"/>
+              </a:ext>
+            </a:extLst>
+          </p:cNvPr>
+          <p:cNvSpPr/>
+          <p:nvPr/>
+        </p:nvSpPr>
+        <p:spPr>
+          <a:xfrm rot="16200000">
+            <a:off x="4927949" y="3626628"/>
+            <a:ext cx="183993" cy="3047952"/>
+          </a:xfrm>
+          <a:prstGeom prst="leftBrace">
+            <a:avLst/>
+          </a:prstGeom>
+        </p:spPr>
+        <p:style>
+          <a:lnRef idx="3">
+            <a:schemeClr val="accent1"/>
+          </a:lnRef>
+          <a:fillRef idx="0">
+            <a:schemeClr val="accent1"/>
+          </a:fillRef>
+          <a:effectRef idx="2">
+            <a:schemeClr val="accent1"/>
+          </a:effectRef>
+          <a:fontRef idx="minor">
+            <a:schemeClr val="tx1"/>
+          </a:fontRef>
+        </p:style>
+        <p:txBody>
+          <a:bodyPr rtlCol="0" anchor="ctr"/>
+          <a:lstStyle/>
+          <a:p>
+            <a:pPr algn="ctr"/>
+            <a:endParaRPr lang="en-US"/>
+          </a:p>
+        </p:txBody>
+      </p:sp>
+      <p:sp>
+        <p:nvSpPr>
+          <p:cNvPr id="9" name="Left Brace 8">
+            <a:extLst>
+              <a:ext uri="{FF2B5EF4-FFF2-40B4-BE49-F238E27FC236}">
+                <a16:creationId xmlns:a16="http://schemas.microsoft.com/office/drawing/2014/main" id="{621956C5-AAA5-488C-8480-BA5AB056A72C}"/>
+              </a:ext>
+            </a:extLst>
+          </p:cNvPr>
+          <p:cNvSpPr/>
+          <p:nvPr/>
+        </p:nvSpPr>
+        <p:spPr>
+          <a:xfrm rot="5400000">
+            <a:off x="2846782" y="4164350"/>
+            <a:ext cx="152400" cy="805912"/>
+          </a:xfrm>
+          <a:prstGeom prst="leftBrace">
+            <a:avLst/>
+          </a:prstGeom>
+        </p:spPr>
+        <p:style>
+          <a:lnRef idx="3">
+            <a:schemeClr val="accent1"/>
+          </a:lnRef>
+          <a:fillRef idx="0">
+            <a:schemeClr val="accent1"/>
+          </a:fillRef>
+          <a:effectRef idx="2">
+            <a:schemeClr val="accent1"/>
+          </a:effectRef>
+          <a:fontRef idx="minor">
+            <a:schemeClr val="tx1"/>
+          </a:fontRef>
+        </p:style>
+        <p:txBody>
+          <a:bodyPr rtlCol="0" anchor="ctr"/>
+          <a:lstStyle/>
+          <a:p>
+            <a:pPr algn="ctr"/>
+            <a:endParaRPr lang="en-US"/>
+          </a:p>
+        </p:txBody>
+      </p:sp>
+      <p:sp>
+        <p:nvSpPr>
+          <p:cNvPr id="10" name="TextBox 9">
+            <a:extLst>
+              <a:ext uri="{FF2B5EF4-FFF2-40B4-BE49-F238E27FC236}">
+                <a16:creationId xmlns:a16="http://schemas.microsoft.com/office/drawing/2014/main" id="{DCA74AB8-4146-42A4-925A-74D97B453881}"/>
+              </a:ext>
+            </a:extLst>
+          </p:cNvPr>
+          <p:cNvSpPr txBox="1"/>
+          <p:nvPr/>
         </p:nvSpPr>
         <p:spPr>
           <a:xfrm>
-            <a:off x="838200" y="365125"/>
-            <a:ext cx="10515600" cy="1325563"/>
+            <a:off x="3831959" y="5319073"/>
+            <a:ext cx="2375971" cy="369332"/>
           </a:xfrm>
+          <a:prstGeom prst="rect">
+            <a:avLst/>
+          </a:prstGeom>
+          <a:noFill/>
         </p:spPr>
         <p:txBody>
-          <a:bodyPr/>
-          <a:lstStyle/>
-          <a:p>
-            <a:r>
-              <a:rPr lang="en-US"/>
-              <a:t>Getting Files on the Server: Windows</a:t>
-            </a:r>
-            <a:endParaRPr lang="en-US" dirty="0"/>
+          <a:bodyPr wrap="none" rtlCol="0">
+            <a:spAutoFit/>
+          </a:bodyPr>
+          <a:lstStyle/>
+          <a:p>
+            <a:r>
+              <a:rPr lang="en-US" dirty="0">
+                <a:solidFill>
+                  <a:schemeClr val="bg2">
+                    <a:lumMod val="50000"/>
+                  </a:schemeClr>
+                </a:solidFill>
+              </a:rPr>
+              <a:t>Name of the server</a:t>
+            </a:r>
+          </a:p>
+        </p:txBody>
+      </p:sp>
+      <p:sp>
+        <p:nvSpPr>
+          <p:cNvPr id="11" name="TextBox 10">
+            <a:extLst>
+              <a:ext uri="{FF2B5EF4-FFF2-40B4-BE49-F238E27FC236}">
+                <a16:creationId xmlns:a16="http://schemas.microsoft.com/office/drawing/2014/main" id="{BF8FD150-98BD-42BE-84E7-BAF136E78AA4}"/>
+              </a:ext>
+            </a:extLst>
+          </p:cNvPr>
+          <p:cNvSpPr txBox="1"/>
+          <p:nvPr/>
+        </p:nvSpPr>
+        <p:spPr>
+          <a:xfrm>
+            <a:off x="1784689" y="4021795"/>
+            <a:ext cx="2276585" cy="369332"/>
+          </a:xfrm>
+          <a:prstGeom prst="rect">
+            <a:avLst/>
+          </a:prstGeom>
+          <a:noFill/>
+        </p:spPr>
+        <p:txBody>
+          <a:bodyPr wrap="none" rtlCol="0">
+            <a:spAutoFit/>
+          </a:bodyPr>
+          <a:lstStyle/>
+          <a:p>
+            <a:r>
+              <a:rPr lang="en-US" dirty="0" err="1">
+                <a:solidFill>
+                  <a:schemeClr val="bg2">
+                    <a:lumMod val="50000"/>
+                  </a:schemeClr>
+                </a:solidFill>
+              </a:rPr>
+              <a:t>SEASnet</a:t>
+            </a:r>
+            <a:r>
+              <a:rPr lang="en-US" dirty="0">
+                <a:solidFill>
+                  <a:schemeClr val="bg2">
+                    <a:lumMod val="50000"/>
+                  </a:schemeClr>
+                </a:solidFill>
+              </a:rPr>
+              <a:t> username</a:t>
+            </a:r>
           </a:p>
         </p:txBody>
       </p:sp>
       <p:pic>
         <p:nvPicPr>
-          <p:cNvPr id="7" name="Picture 6">
-            <a:extLst>
-              <a:ext uri="{FF2B5EF4-FFF2-40B4-BE49-F238E27FC236}">
-                <a16:creationId xmlns:a16="http://schemas.microsoft.com/office/drawing/2014/main" id="{2F2EEACF-4732-4126-A002-2C3B623BC915}"/>
+          <p:cNvPr id="12" name="Picture 11">
+            <a:extLst>
+              <a:ext uri="{FF2B5EF4-FFF2-40B4-BE49-F238E27FC236}">
+                <a16:creationId xmlns:a16="http://schemas.microsoft.com/office/drawing/2014/main" id="{B5AC4085-0A65-4140-A0CD-995DD2CC1FBC}"/>
               </a:ext>
             </a:extLst>
           </p:cNvPr>
@@ -5149,39 +7367,202 @@
         </p:blipFill>
         <p:spPr>
           <a:xfrm>
-            <a:off x="1115950" y="1690688"/>
-            <a:ext cx="5699428" cy="4692353"/>
+            <a:off x="651534" y="1949249"/>
+            <a:ext cx="6096000" cy="838200"/>
           </a:xfrm>
           <a:prstGeom prst="rect">
             <a:avLst/>
           </a:prstGeom>
         </p:spPr>
       </p:pic>
-      <p:sp>
-        <p:nvSpPr>
-          <p:cNvPr id="8" name="Content Placeholder 2">
-            <a:extLst>
-              <a:ext uri="{FF2B5EF4-FFF2-40B4-BE49-F238E27FC236}">
-                <a16:creationId xmlns:a16="http://schemas.microsoft.com/office/drawing/2014/main" id="{4AEBE0E1-929A-439D-AE65-049D51921C71}"/>
-              </a:ext>
-            </a:extLst>
-          </p:cNvPr>
-          <p:cNvSpPr>
-            <a:spLocks noGrp="1"/>
-          </p:cNvSpPr>
-          <p:nvPr>
-            <p:ph sz="half" idx="1"/>
-          </p:nvPr>
-        </p:nvSpPr>
+      <p:cxnSp>
+        <p:nvCxnSpPr>
+          <p:cNvPr id="13" name="Connector: Curved 12">
+            <a:extLst>
+              <a:ext uri="{FF2B5EF4-FFF2-40B4-BE49-F238E27FC236}">
+                <a16:creationId xmlns:a16="http://schemas.microsoft.com/office/drawing/2014/main" id="{DFF47417-84F8-48D1-A3F0-788749D17902}"/>
+              </a:ext>
+            </a:extLst>
+          </p:cNvPr>
+          <p:cNvCxnSpPr>
+            <a:cxnSpLocks/>
+          </p:cNvCxnSpPr>
+          <p:nvPr/>
+        </p:nvCxnSpPr>
+        <p:spPr>
+          <a:xfrm rot="5400000">
+            <a:off x="3220632" y="2295809"/>
+            <a:ext cx="1681285" cy="1564092"/>
+          </a:xfrm>
+          <a:prstGeom prst="curvedConnector3">
+            <a:avLst>
+              <a:gd name="adj1" fmla="val 50000"/>
+            </a:avLst>
+          </a:prstGeom>
+          <a:ln>
+            <a:tailEnd type="triangle"/>
+          </a:ln>
+        </p:spPr>
+        <p:style>
+          <a:lnRef idx="1">
+            <a:schemeClr val="accent2"/>
+          </a:lnRef>
+          <a:fillRef idx="0">
+            <a:schemeClr val="accent2"/>
+          </a:fillRef>
+          <a:effectRef idx="0">
+            <a:schemeClr val="accent2"/>
+          </a:effectRef>
+          <a:fontRef idx="minor">
+            <a:schemeClr val="tx1"/>
+          </a:fontRef>
+        </p:style>
+      </p:cxnSp>
+      <p:pic>
+        <p:nvPicPr>
+          <p:cNvPr id="15" name="Picture 14">
+            <a:extLst>
+              <a:ext uri="{FF2B5EF4-FFF2-40B4-BE49-F238E27FC236}">
+                <a16:creationId xmlns:a16="http://schemas.microsoft.com/office/drawing/2014/main" id="{37AD45F3-69A8-4D30-81CD-B832D9B168D2}"/>
+              </a:ext>
+            </a:extLst>
+          </p:cNvPr>
+          <p:cNvPicPr>
+            <a:picLocks noChangeAspect="1"/>
+          </p:cNvPicPr>
+          <p:nvPr/>
+        </p:nvPicPr>
+        <p:blipFill rotWithShape="1">
+          <a:blip r:embed="rId2">
+            <a:extLst>
+              <a:ext uri="{28A0092B-C50C-407E-A947-70E740481C1C}">
+                <a14:useLocalDpi xmlns:a14="http://schemas.microsoft.com/office/drawing/2010/main" val="0"/>
+              </a:ext>
+            </a:extLst>
+          </a:blip>
+          <a:srcRect l="50065" t="1975" r="5389" b="78687"/>
+          <a:stretch/>
+        </p:blipFill>
         <p:spPr>
           <a:xfrm>
-            <a:off x="7198822" y="2520019"/>
-            <a:ext cx="4596015" cy="3206526"/>
+            <a:off x="1915424" y="4705865"/>
+            <a:ext cx="4628496" cy="276270"/>
+          </a:xfrm>
+          <a:prstGeom prst="rect">
+            <a:avLst/>
+          </a:prstGeom>
+        </p:spPr>
+      </p:pic>
+      <p:sp>
+        <p:nvSpPr>
+          <p:cNvPr id="17" name="Left Brace 16">
+            <a:extLst>
+              <a:ext uri="{FF2B5EF4-FFF2-40B4-BE49-F238E27FC236}">
+                <a16:creationId xmlns:a16="http://schemas.microsoft.com/office/drawing/2014/main" id="{243AC597-F234-4108-AF39-2A36BB162185}"/>
+              </a:ext>
+            </a:extLst>
+          </p:cNvPr>
+          <p:cNvSpPr/>
+          <p:nvPr/>
+        </p:nvSpPr>
+        <p:spPr>
+          <a:xfrm rot="16200000">
+            <a:off x="2068688" y="4884323"/>
+            <a:ext cx="161172" cy="509740"/>
+          </a:xfrm>
+          <a:prstGeom prst="leftBrace">
+            <a:avLst/>
+          </a:prstGeom>
+        </p:spPr>
+        <p:style>
+          <a:lnRef idx="3">
+            <a:schemeClr val="accent1"/>
+          </a:lnRef>
+          <a:fillRef idx="0">
+            <a:schemeClr val="accent1"/>
+          </a:fillRef>
+          <a:effectRef idx="2">
+            <a:schemeClr val="accent1"/>
+          </a:effectRef>
+          <a:fontRef idx="minor">
+            <a:schemeClr val="tx1"/>
+          </a:fontRef>
+        </p:style>
+        <p:txBody>
+          <a:bodyPr rtlCol="0" anchor="ctr"/>
+          <a:lstStyle/>
+          <a:p>
+            <a:pPr algn="ctr"/>
+            <a:endParaRPr lang="en-US"/>
+          </a:p>
+        </p:txBody>
+      </p:sp>
+      <p:sp>
+        <p:nvSpPr>
+          <p:cNvPr id="18" name="TextBox 17">
+            <a:extLst>
+              <a:ext uri="{FF2B5EF4-FFF2-40B4-BE49-F238E27FC236}">
+                <a16:creationId xmlns:a16="http://schemas.microsoft.com/office/drawing/2014/main" id="{3DCFA810-488D-4293-A88D-5FA9F35A3EBD}"/>
+              </a:ext>
+            </a:extLst>
+          </p:cNvPr>
+          <p:cNvSpPr txBox="1"/>
+          <p:nvPr/>
+        </p:nvSpPr>
+        <p:spPr>
+          <a:xfrm>
+            <a:off x="733662" y="5296250"/>
+            <a:ext cx="2831224" cy="369332"/>
+          </a:xfrm>
+          <a:prstGeom prst="rect">
+            <a:avLst/>
+          </a:prstGeom>
+          <a:noFill/>
+        </p:spPr>
+        <p:txBody>
+          <a:bodyPr wrap="none" rtlCol="0">
+            <a:spAutoFit/>
+          </a:bodyPr>
+          <a:lstStyle/>
+          <a:p>
+            <a:r>
+              <a:rPr lang="en-US" dirty="0">
+                <a:solidFill>
+                  <a:schemeClr val="bg2">
+                    <a:lumMod val="50000"/>
+                  </a:schemeClr>
+                </a:solidFill>
+              </a:rPr>
+              <a:t>Command used to login</a:t>
+            </a:r>
+          </a:p>
+        </p:txBody>
+      </p:sp>
+      <p:sp>
+        <p:nvSpPr>
+          <p:cNvPr id="21" name="Content Placeholder 2">
+            <a:extLst>
+              <a:ext uri="{FF2B5EF4-FFF2-40B4-BE49-F238E27FC236}">
+                <a16:creationId xmlns:a16="http://schemas.microsoft.com/office/drawing/2014/main" id="{BFBD5EEB-AFB2-49AA-8331-B329F3F059FC}"/>
+              </a:ext>
+            </a:extLst>
+          </p:cNvPr>
+          <p:cNvSpPr>
+            <a:spLocks noGrp="1"/>
+          </p:cNvSpPr>
+          <p:nvPr>
+            <p:ph sz="half" idx="1"/>
+          </p:nvPr>
+        </p:nvSpPr>
+        <p:spPr>
+          <a:xfrm>
+            <a:off x="7060980" y="2463604"/>
+            <a:ext cx="4628496" cy="2756175"/>
           </a:xfrm>
         </p:spPr>
         <p:txBody>
           <a:bodyPr>
-            <a:normAutofit/>
+            <a:normAutofit lnSpcReduction="10000"/>
           </a:bodyPr>
           <a:lstStyle/>
           <a:p>
@@ -5191,17 +7572,23 @@
                   <a:srgbClr val="5A504A"/>
                 </a:solidFill>
               </a:rPr>
-              <a:t>The left is your local computer file system</a:t>
-            </a:r>
-          </a:p>
-          <a:p>
+              <a:t>Type in your </a:t>
+            </a:r>
+            <a:r>
+              <a:rPr lang="en-US" dirty="0" err="1">
+                <a:solidFill>
+                  <a:srgbClr val="5A504A"/>
+                </a:solidFill>
+              </a:rPr>
+              <a:t>SEASnet</a:t>
+            </a:r>
             <a:r>
               <a:rPr lang="en-US" dirty="0">
                 <a:solidFill>
                   <a:srgbClr val="5A504A"/>
                 </a:solidFill>
               </a:rPr>
-              <a:t>The right is the Linux server file system</a:t>
+              <a:t> password</a:t>
             </a:r>
           </a:p>
           <a:p>
@@ -5211,7 +7598,17 @@
                   <a:srgbClr val="5A504A"/>
                 </a:solidFill>
               </a:rPr>
-              <a:t>You could easily drag and drop across both</a:t>
+              <a:t>If no characters appear, don’t worry, that is normal</a:t>
+            </a:r>
+          </a:p>
+          <a:p>
+            <a:r>
+              <a:rPr lang="en-US" dirty="0">
+                <a:solidFill>
+                  <a:srgbClr val="5A504A"/>
+                </a:solidFill>
+              </a:rPr>
+              <a:t>Hit enter when you are done</a:t>
             </a:r>
           </a:p>
           <a:p>
@@ -5233,7 +7630,7 @@
     </p:spTree>
     <p:extLst>
       <p:ext uri="{BB962C8B-B14F-4D97-AF65-F5344CB8AC3E}">
-        <p14:creationId xmlns:p14="http://schemas.microsoft.com/office/powerpoint/2010/main" val="1009855385"/>
+        <p14:creationId xmlns:p14="http://schemas.microsoft.com/office/powerpoint/2010/main" val="1535650040"/>
       </p:ext>
     </p:extLst>
   </p:cSld>

</xml_diff>